<commit_message>
presentation: Introduction slide added, performance measurement graph added
</commit_message>
<xml_diff>
--- a/presentation/ODataERP II.pptx
+++ b/presentation/ODataERP II.pptx
@@ -5,20 +5,25 @@
     <p:sldMasterId id="2147483660" r:id="rId1"/>
   </p:sldMasterIdLst>
   <p:notesMasterIdLst>
-    <p:notesMasterId r:id="rId13"/>
+    <p:notesMasterId r:id="rId15"/>
   </p:notesMasterIdLst>
+  <p:handoutMasterIdLst>
+    <p:handoutMasterId r:id="rId16"/>
+  </p:handoutMasterIdLst>
   <p:sldIdLst>
     <p:sldId id="256" r:id="rId2"/>
-    <p:sldId id="275" r:id="rId3"/>
-    <p:sldId id="281" r:id="rId4"/>
-    <p:sldId id="282" r:id="rId5"/>
-    <p:sldId id="272" r:id="rId6"/>
-    <p:sldId id="278" r:id="rId7"/>
-    <p:sldId id="277" r:id="rId8"/>
-    <p:sldId id="273" r:id="rId9"/>
-    <p:sldId id="274" r:id="rId10"/>
-    <p:sldId id="283" r:id="rId11"/>
-    <p:sldId id="262" r:id="rId12"/>
+    <p:sldId id="284" r:id="rId3"/>
+    <p:sldId id="285" r:id="rId4"/>
+    <p:sldId id="275" r:id="rId5"/>
+    <p:sldId id="281" r:id="rId6"/>
+    <p:sldId id="282" r:id="rId7"/>
+    <p:sldId id="272" r:id="rId8"/>
+    <p:sldId id="278" r:id="rId9"/>
+    <p:sldId id="277" r:id="rId10"/>
+    <p:sldId id="273" r:id="rId11"/>
+    <p:sldId id="274" r:id="rId12"/>
+    <p:sldId id="283" r:id="rId13"/>
+    <p:sldId id="262" r:id="rId14"/>
   </p:sldIdLst>
   <p:sldSz cx="9144000" cy="6858000" type="screen4x3"/>
   <p:notesSz cx="6858000" cy="9144000"/>
@@ -120,6 +125,520 @@
 </p:presentation>
 </file>
 
+<file path=ppt/charts/chart1.xml><?xml version="1.0" encoding="utf-8"?>
+<c:chartSpace xmlns:c="http://schemas.openxmlformats.org/drawingml/2006/chart" xmlns:a="http://schemas.openxmlformats.org/drawingml/2006/main" xmlns:r="http://schemas.openxmlformats.org/officeDocument/2006/relationships">
+  <c:date1904 val="0"/>
+  <c:lang val="en-US"/>
+  <c:roundedCorners val="0"/>
+  <mc:AlternateContent xmlns:mc="http://schemas.openxmlformats.org/markup-compatibility/2006">
+    <mc:Choice xmlns:c14="http://schemas.microsoft.com/office/drawing/2007/8/2/chart" Requires="c14">
+      <c14:style val="118"/>
+    </mc:Choice>
+    <mc:Fallback>
+      <c:style val="18"/>
+    </mc:Fallback>
+  </mc:AlternateContent>
+  <c:chart>
+    <c:autoTitleDeleted val="0"/>
+    <c:plotArea>
+      <c:layout/>
+      <c:barChart>
+        <c:barDir val="col"/>
+        <c:grouping val="percentStacked"/>
+        <c:varyColors val="0"/>
+        <c:ser>
+          <c:idx val="0"/>
+          <c:order val="0"/>
+          <c:tx>
+            <c:strRef>
+              <c:f>Sheet1!$B$1</c:f>
+              <c:strCache>
+                <c:ptCount val="1"/>
+                <c:pt idx="0">
+                  <c:v>Header</c:v>
+                </c:pt>
+              </c:strCache>
+            </c:strRef>
+          </c:tx>
+          <c:invertIfNegative val="0"/>
+          <c:cat>
+            <c:strRef>
+              <c:f>Sheet1!$A$2:$A$5</c:f>
+              <c:strCache>
+                <c:ptCount val="3"/>
+                <c:pt idx="0">
+                  <c:v>CreateSalesOrder</c:v>
+                </c:pt>
+                <c:pt idx="1">
+                  <c:v>ReadSalesOrders</c:v>
+                </c:pt>
+                <c:pt idx="2">
+                  <c:v>UpdateStatus</c:v>
+                </c:pt>
+              </c:strCache>
+            </c:strRef>
+          </c:cat>
+          <c:val>
+            <c:numRef>
+              <c:f>Sheet1!$B$2:$B$4</c:f>
+              <c:numCache>
+                <c:formatCode>General</c:formatCode>
+                <c:ptCount val="3"/>
+                <c:pt idx="0">
+                  <c:v>30.0</c:v>
+                </c:pt>
+                <c:pt idx="1">
+                  <c:v>10.0</c:v>
+                </c:pt>
+                <c:pt idx="2">
+                  <c:v>60.0</c:v>
+                </c:pt>
+              </c:numCache>
+            </c:numRef>
+          </c:val>
+        </c:ser>
+        <c:ser>
+          <c:idx val="1"/>
+          <c:order val="1"/>
+          <c:tx>
+            <c:strRef>
+              <c:f>Sheet1!$C$1</c:f>
+              <c:strCache>
+                <c:ptCount val="1"/>
+                <c:pt idx="0">
+                  <c:v>Metadata</c:v>
+                </c:pt>
+              </c:strCache>
+            </c:strRef>
+          </c:tx>
+          <c:invertIfNegative val="0"/>
+          <c:cat>
+            <c:strRef>
+              <c:f>Sheet1!$A$2:$A$5</c:f>
+              <c:strCache>
+                <c:ptCount val="3"/>
+                <c:pt idx="0">
+                  <c:v>CreateSalesOrder</c:v>
+                </c:pt>
+                <c:pt idx="1">
+                  <c:v>ReadSalesOrders</c:v>
+                </c:pt>
+                <c:pt idx="2">
+                  <c:v>UpdateStatus</c:v>
+                </c:pt>
+              </c:strCache>
+            </c:strRef>
+          </c:cat>
+          <c:val>
+            <c:numRef>
+              <c:f>Sheet1!$C$2:$C$4</c:f>
+              <c:numCache>
+                <c:formatCode>General</c:formatCode>
+                <c:ptCount val="3"/>
+                <c:pt idx="0">
+                  <c:v>30.0</c:v>
+                </c:pt>
+                <c:pt idx="1">
+                  <c:v>60.0</c:v>
+                </c:pt>
+                <c:pt idx="2">
+                  <c:v>20.0</c:v>
+                </c:pt>
+              </c:numCache>
+            </c:numRef>
+          </c:val>
+        </c:ser>
+        <c:ser>
+          <c:idx val="2"/>
+          <c:order val="2"/>
+          <c:tx>
+            <c:strRef>
+              <c:f>Sheet1!$D$1</c:f>
+              <c:strCache>
+                <c:ptCount val="1"/>
+                <c:pt idx="0">
+                  <c:v>Urls</c:v>
+                </c:pt>
+              </c:strCache>
+            </c:strRef>
+          </c:tx>
+          <c:invertIfNegative val="0"/>
+          <c:cat>
+            <c:strRef>
+              <c:f>Sheet1!$A$2:$A$5</c:f>
+              <c:strCache>
+                <c:ptCount val="3"/>
+                <c:pt idx="0">
+                  <c:v>CreateSalesOrder</c:v>
+                </c:pt>
+                <c:pt idx="1">
+                  <c:v>ReadSalesOrders</c:v>
+                </c:pt>
+                <c:pt idx="2">
+                  <c:v>UpdateStatus</c:v>
+                </c:pt>
+              </c:strCache>
+            </c:strRef>
+          </c:cat>
+          <c:val>
+            <c:numRef>
+              <c:f>Sheet1!$D$2:$D$4</c:f>
+              <c:numCache>
+                <c:formatCode>General</c:formatCode>
+                <c:ptCount val="3"/>
+                <c:pt idx="0">
+                  <c:v>20.0</c:v>
+                </c:pt>
+                <c:pt idx="1">
+                  <c:v>20.0</c:v>
+                </c:pt>
+                <c:pt idx="2">
+                  <c:v>10.0</c:v>
+                </c:pt>
+              </c:numCache>
+            </c:numRef>
+          </c:val>
+        </c:ser>
+        <c:ser>
+          <c:idx val="3"/>
+          <c:order val="3"/>
+          <c:tx>
+            <c:strRef>
+              <c:f>Sheet1!$E$1</c:f>
+              <c:strCache>
+                <c:ptCount val="1"/>
+                <c:pt idx="0">
+                  <c:v>Names</c:v>
+                </c:pt>
+              </c:strCache>
+            </c:strRef>
+          </c:tx>
+          <c:invertIfNegative val="0"/>
+          <c:cat>
+            <c:strRef>
+              <c:f>Sheet1!$A$2:$A$5</c:f>
+              <c:strCache>
+                <c:ptCount val="3"/>
+                <c:pt idx="0">
+                  <c:v>CreateSalesOrder</c:v>
+                </c:pt>
+                <c:pt idx="1">
+                  <c:v>ReadSalesOrders</c:v>
+                </c:pt>
+                <c:pt idx="2">
+                  <c:v>UpdateStatus</c:v>
+                </c:pt>
+              </c:strCache>
+            </c:strRef>
+          </c:cat>
+          <c:val>
+            <c:numRef>
+              <c:f>Sheet1!$E$2:$E$4</c:f>
+              <c:numCache>
+                <c:formatCode>General</c:formatCode>
+                <c:ptCount val="3"/>
+                <c:pt idx="0">
+                  <c:v>16.0</c:v>
+                </c:pt>
+                <c:pt idx="1">
+                  <c:v>8.0</c:v>
+                </c:pt>
+                <c:pt idx="2">
+                  <c:v>8.0</c:v>
+                </c:pt>
+              </c:numCache>
+            </c:numRef>
+          </c:val>
+        </c:ser>
+        <c:ser>
+          <c:idx val="4"/>
+          <c:order val="4"/>
+          <c:tx>
+            <c:strRef>
+              <c:f>Sheet1!$F$1</c:f>
+              <c:strCache>
+                <c:ptCount val="1"/>
+                <c:pt idx="0">
+                  <c:v>Values</c:v>
+                </c:pt>
+              </c:strCache>
+            </c:strRef>
+          </c:tx>
+          <c:invertIfNegative val="0"/>
+          <c:cat>
+            <c:strRef>
+              <c:f>Sheet1!$A$2:$A$5</c:f>
+              <c:strCache>
+                <c:ptCount val="3"/>
+                <c:pt idx="0">
+                  <c:v>CreateSalesOrder</c:v>
+                </c:pt>
+                <c:pt idx="1">
+                  <c:v>ReadSalesOrders</c:v>
+                </c:pt>
+                <c:pt idx="2">
+                  <c:v>UpdateStatus</c:v>
+                </c:pt>
+              </c:strCache>
+            </c:strRef>
+          </c:cat>
+          <c:val>
+            <c:numRef>
+              <c:f>Sheet1!$F$2:$F$4</c:f>
+              <c:numCache>
+                <c:formatCode>General</c:formatCode>
+                <c:ptCount val="3"/>
+                <c:pt idx="0">
+                  <c:v>4.0</c:v>
+                </c:pt>
+                <c:pt idx="1">
+                  <c:v>2.0</c:v>
+                </c:pt>
+                <c:pt idx="2">
+                  <c:v>2.0</c:v>
+                </c:pt>
+              </c:numCache>
+            </c:numRef>
+          </c:val>
+        </c:ser>
+        <c:dLbls>
+          <c:showLegendKey val="0"/>
+          <c:showVal val="0"/>
+          <c:showCatName val="0"/>
+          <c:showSerName val="0"/>
+          <c:showPercent val="0"/>
+          <c:showBubbleSize val="0"/>
+        </c:dLbls>
+        <c:gapWidth val="150"/>
+        <c:overlap val="100"/>
+        <c:axId val="1863292920"/>
+        <c:axId val="1908109160"/>
+      </c:barChart>
+      <c:catAx>
+        <c:axId val="1863292920"/>
+        <c:scaling>
+          <c:orientation val="minMax"/>
+        </c:scaling>
+        <c:delete val="0"/>
+        <c:axPos val="b"/>
+        <c:majorTickMark val="out"/>
+        <c:minorTickMark val="none"/>
+        <c:tickLblPos val="nextTo"/>
+        <c:crossAx val="1908109160"/>
+        <c:crosses val="autoZero"/>
+        <c:auto val="1"/>
+        <c:lblAlgn val="ctr"/>
+        <c:lblOffset val="100"/>
+        <c:noMultiLvlLbl val="0"/>
+      </c:catAx>
+      <c:valAx>
+        <c:axId val="1908109160"/>
+        <c:scaling>
+          <c:orientation val="minMax"/>
+        </c:scaling>
+        <c:delete val="0"/>
+        <c:axPos val="l"/>
+        <c:majorGridlines/>
+        <c:numFmt formatCode="0%" sourceLinked="1"/>
+        <c:majorTickMark val="out"/>
+        <c:minorTickMark val="none"/>
+        <c:tickLblPos val="nextTo"/>
+        <c:crossAx val="1863292920"/>
+        <c:crosses val="autoZero"/>
+        <c:crossBetween val="between"/>
+      </c:valAx>
+    </c:plotArea>
+    <c:legend>
+      <c:legendPos val="r"/>
+      <c:layout/>
+      <c:overlay val="0"/>
+    </c:legend>
+    <c:plotVisOnly val="1"/>
+    <c:dispBlanksAs val="gap"/>
+    <c:showDLblsOverMax val="0"/>
+  </c:chart>
+  <c:txPr>
+    <a:bodyPr/>
+    <a:lstStyle/>
+    <a:p>
+      <a:pPr>
+        <a:defRPr sz="1800"/>
+      </a:pPr>
+      <a:endParaRPr lang="en-US"/>
+    </a:p>
+  </c:txPr>
+  <c:externalData r:id="rId1">
+    <c:autoUpdate val="0"/>
+  </c:externalData>
+</c:chartSpace>
+</file>
+
+<file path=ppt/handoutMasters/handoutMaster1.xml><?xml version="1.0" encoding="utf-8"?>
+<p:handoutMaster xmlns:a="http://schemas.openxmlformats.org/drawingml/2006/main" xmlns:r="http://schemas.openxmlformats.org/officeDocument/2006/relationships" xmlns:p="http://schemas.openxmlformats.org/presentationml/2006/main">
+  <p:cSld>
+    <p:bg>
+      <p:bgRef idx="1001">
+        <a:schemeClr val="bg1"/>
+      </p:bgRef>
+    </p:bg>
+    <p:spTree>
+      <p:nvGrpSpPr>
+        <p:cNvPr id="1" name=""/>
+        <p:cNvGrpSpPr/>
+        <p:nvPr/>
+      </p:nvGrpSpPr>
+      <p:grpSpPr>
+        <a:xfrm>
+          <a:off x="0" y="0"/>
+          <a:ext cx="0" cy="0"/>
+          <a:chOff x="0" y="0"/>
+          <a:chExt cx="0" cy="0"/>
+        </a:xfrm>
+      </p:grpSpPr>
+      <p:sp>
+        <p:nvSpPr>
+          <p:cNvPr id="2" name="Header Placeholder 1"/>
+          <p:cNvSpPr>
+            <a:spLocks noGrp="1"/>
+          </p:cNvSpPr>
+          <p:nvPr>
+            <p:ph type="hdr" sz="quarter"/>
+          </p:nvPr>
+        </p:nvSpPr>
+        <p:spPr>
+          <a:xfrm>
+            <a:off x="0" y="0"/>
+            <a:ext cx="2971800" cy="457200"/>
+          </a:xfrm>
+          <a:prstGeom prst="rect">
+            <a:avLst/>
+          </a:prstGeom>
+        </p:spPr>
+        <p:txBody>
+          <a:bodyPr vert="horz" lIns="91440" tIns="45720" rIns="91440" bIns="45720" rtlCol="0"/>
+          <a:lstStyle>
+            <a:lvl1pPr algn="l">
+              <a:defRPr sz="1200"/>
+            </a:lvl1pPr>
+          </a:lstStyle>
+          <a:p>
+            <a:endParaRPr lang="en-US"/>
+          </a:p>
+        </p:txBody>
+      </p:sp>
+      <p:sp>
+        <p:nvSpPr>
+          <p:cNvPr id="3" name="Date Placeholder 2"/>
+          <p:cNvSpPr>
+            <a:spLocks noGrp="1"/>
+          </p:cNvSpPr>
+          <p:nvPr>
+            <p:ph type="dt" sz="quarter" idx="1"/>
+          </p:nvPr>
+        </p:nvSpPr>
+        <p:spPr>
+          <a:xfrm>
+            <a:off x="3884613" y="0"/>
+            <a:ext cx="2971800" cy="457200"/>
+          </a:xfrm>
+          <a:prstGeom prst="rect">
+            <a:avLst/>
+          </a:prstGeom>
+        </p:spPr>
+        <p:txBody>
+          <a:bodyPr vert="horz" lIns="91440" tIns="45720" rIns="91440" bIns="45720" rtlCol="0"/>
+          <a:lstStyle>
+            <a:lvl1pPr algn="r">
+              <a:defRPr sz="1200"/>
+            </a:lvl1pPr>
+          </a:lstStyle>
+          <a:p>
+            <a:fld id="{571A509C-DBE6-F444-AAC2-EBB14B9E3373}" type="datetimeFigureOut">
+              <a:rPr lang="en-US" smtClean="0"/>
+              <a:t>7/9/12</a:t>
+            </a:fld>
+            <a:endParaRPr lang="en-US"/>
+          </a:p>
+        </p:txBody>
+      </p:sp>
+      <p:sp>
+        <p:nvSpPr>
+          <p:cNvPr id="4" name="Footer Placeholder 3"/>
+          <p:cNvSpPr>
+            <a:spLocks noGrp="1"/>
+          </p:cNvSpPr>
+          <p:nvPr>
+            <p:ph type="ftr" sz="quarter" idx="2"/>
+          </p:nvPr>
+        </p:nvSpPr>
+        <p:spPr>
+          <a:xfrm>
+            <a:off x="0" y="8685213"/>
+            <a:ext cx="2971800" cy="457200"/>
+          </a:xfrm>
+          <a:prstGeom prst="rect">
+            <a:avLst/>
+          </a:prstGeom>
+        </p:spPr>
+        <p:txBody>
+          <a:bodyPr vert="horz" lIns="91440" tIns="45720" rIns="91440" bIns="45720" rtlCol="0" anchor="b"/>
+          <a:lstStyle>
+            <a:lvl1pPr algn="l">
+              <a:defRPr sz="1200"/>
+            </a:lvl1pPr>
+          </a:lstStyle>
+          <a:p>
+            <a:endParaRPr lang="en-US"/>
+          </a:p>
+        </p:txBody>
+      </p:sp>
+      <p:sp>
+        <p:nvSpPr>
+          <p:cNvPr id="5" name="Slide Number Placeholder 4"/>
+          <p:cNvSpPr>
+            <a:spLocks noGrp="1"/>
+          </p:cNvSpPr>
+          <p:nvPr>
+            <p:ph type="sldNum" sz="quarter" idx="3"/>
+          </p:nvPr>
+        </p:nvSpPr>
+        <p:spPr>
+          <a:xfrm>
+            <a:off x="3884613" y="8685213"/>
+            <a:ext cx="2971800" cy="457200"/>
+          </a:xfrm>
+          <a:prstGeom prst="rect">
+            <a:avLst/>
+          </a:prstGeom>
+        </p:spPr>
+        <p:txBody>
+          <a:bodyPr vert="horz" lIns="91440" tIns="45720" rIns="91440" bIns="45720" rtlCol="0" anchor="b"/>
+          <a:lstStyle>
+            <a:lvl1pPr algn="r">
+              <a:defRPr sz="1200"/>
+            </a:lvl1pPr>
+          </a:lstStyle>
+          <a:p>
+            <a:fld id="{9F85E8B4-F3D1-B34F-92CC-4A03728CD9B9}" type="slidenum">
+              <a:rPr lang="en-US" smtClean="0"/>
+              <a:t>‹#›</a:t>
+            </a:fld>
+            <a:endParaRPr lang="en-US"/>
+          </a:p>
+        </p:txBody>
+      </p:sp>
+    </p:spTree>
+    <p:extLst>
+      <p:ext uri="{BB962C8B-B14F-4D97-AF65-F5344CB8AC3E}">
+        <p14:creationId xmlns:p14="http://schemas.microsoft.com/office/powerpoint/2010/main" val="2340301165"/>
+      </p:ext>
+    </p:extLst>
+  </p:cSld>
+  <p:clrMap bg1="lt1" tx1="dk1" bg2="lt2" tx2="dk2" accent1="accent1" accent2="accent2" accent3="accent3" accent4="accent4" accent5="accent5" accent6="accent6" hlink="hlink" folHlink="folHlink"/>
+  <p:hf hdr="0" ftr="0" dt="0"/>
+</p:handoutMaster>
+</file>
+
 <file path=ppt/notesMasters/notesMaster1.xml><?xml version="1.0" encoding="utf-8"?>
 <p:notesMaster xmlns:a="http://schemas.openxmlformats.org/drawingml/2006/main" xmlns:r="http://schemas.openxmlformats.org/officeDocument/2006/relationships" xmlns:p="http://schemas.openxmlformats.org/presentationml/2006/main">
   <p:cSld>
@@ -202,7 +721,7 @@
           <a:p>
             <a:fld id="{F8F0D44B-776D-4908-B135-BED6833C9F76}" type="datetimeFigureOut">
               <a:rPr lang="en-US" smtClean="0"/>
-              <a:t>7/5/12</a:t>
+              <a:t>7/9/12</a:t>
             </a:fld>
             <a:endParaRPr lang="en-US"/>
           </a:p>
@@ -375,6 +894,7 @@
     </p:extLst>
   </p:cSld>
   <p:clrMap bg1="lt1" tx1="dk1" bg2="lt2" tx2="dk2" accent1="accent1" accent2="accent2" accent3="accent3" accent4="accent4" accent5="accent5" accent6="accent6" hlink="hlink" folHlink="folHlink"/>
+  <p:hf hdr="0" ftr="0" dt="0"/>
   <p:notesStyle>
     <a:lvl1pPr marL="0" algn="l" defTabSz="914400" rtl="0" eaLnBrk="1" latinLnBrk="0" hangingPunct="1">
       <a:defRPr sz="1200" kern="1200">
@@ -641,7 +1161,7 @@
           <a:p>
             <a:fld id="{044E5767-879F-458F-B26E-09FB80BCAC35}" type="slidenum">
               <a:rPr lang="en-US" smtClean="0"/>
-              <a:t>5</a:t>
+              <a:t>7</a:t>
             </a:fld>
             <a:endParaRPr lang="en-US"/>
           </a:p>
@@ -839,7 +1359,7 @@
           <a:p>
             <a:fld id="{044E5767-879F-458F-B26E-09FB80BCAC35}" type="slidenum">
               <a:rPr lang="en-US" smtClean="0"/>
-              <a:t>6</a:t>
+              <a:t>8</a:t>
             </a:fld>
             <a:endParaRPr lang="en-US"/>
           </a:p>
@@ -1080,7 +1600,7 @@
           <a:p>
             <a:fld id="{044E5767-879F-458F-B26E-09FB80BCAC35}" type="slidenum">
               <a:rPr lang="en-US" smtClean="0"/>
-              <a:t>7</a:t>
+              <a:t>9</a:t>
             </a:fld>
             <a:endParaRPr lang="en-US"/>
           </a:p>
@@ -1206,11 +1726,7 @@
           <a:p>
             <a:r>
               <a:rPr lang="en-US" dirty="0" err="1" smtClean="0"/>
-              <a:t>geschw</a:t>
-            </a:r>
-            <a:r>
-              <a:rPr lang="en-US" dirty="0" err="1" smtClean="0"/>
-              <a:t>ätzig</a:t>
+              <a:t>geschwätzig</a:t>
             </a:r>
             <a:endParaRPr lang="en-US" dirty="0"/>
           </a:p>
@@ -1233,7 +1749,7 @@
           <a:p>
             <a:fld id="{044E5767-879F-458F-B26E-09FB80BCAC35}" type="slidenum">
               <a:rPr lang="en-US" smtClean="0"/>
-              <a:t>8</a:t>
+              <a:t>10</a:t>
             </a:fld>
             <a:endParaRPr lang="en-US"/>
           </a:p>
@@ -1332,7 +1848,7 @@
           <a:p>
             <a:fld id="{044E5767-879F-458F-B26E-09FB80BCAC35}" type="slidenum">
               <a:rPr lang="en-US" smtClean="0"/>
-              <a:t>11</a:t>
+              <a:t>13</a:t>
             </a:fld>
             <a:endParaRPr lang="en-US"/>
           </a:p>
@@ -1536,9 +2052,9 @@
           <a:bodyPr/>
           <a:lstStyle/>
           <a:p>
-            <a:fld id="{45C7489E-969B-49EA-82EC-3ACE3D17C8D8}" type="datetimeFigureOut">
+            <a:fld id="{78300770-276E-9A42-B0EB-25F0A938FAD9}" type="datetime1">
               <a:rPr lang="en-US" smtClean="0"/>
-              <a:t>7/5/12</a:t>
+              <a:t>7/9/12</a:t>
             </a:fld>
             <a:endParaRPr lang="en-US"/>
           </a:p>
@@ -1701,9 +2217,9 @@
           <a:bodyPr/>
           <a:lstStyle/>
           <a:p>
-            <a:fld id="{45C7489E-969B-49EA-82EC-3ACE3D17C8D8}" type="datetimeFigureOut">
+            <a:fld id="{C3B27A16-D319-7E46-9ECF-3E73CAD7A292}" type="datetime1">
               <a:rPr lang="en-US" smtClean="0"/>
-              <a:t>7/5/12</a:t>
+              <a:t>7/9/12</a:t>
             </a:fld>
             <a:endParaRPr lang="en-US"/>
           </a:p>
@@ -1876,9 +2392,9 @@
           <a:bodyPr/>
           <a:lstStyle/>
           <a:p>
-            <a:fld id="{45C7489E-969B-49EA-82EC-3ACE3D17C8D8}" type="datetimeFigureOut">
+            <a:fld id="{5836FFB4-FB7B-9F41-85BC-85E8238A3BC6}" type="datetime1">
               <a:rPr lang="en-US" smtClean="0"/>
-              <a:t>7/5/12</a:t>
+              <a:t>7/9/12</a:t>
             </a:fld>
             <a:endParaRPr lang="en-US"/>
           </a:p>
@@ -2041,9 +2557,9 @@
           <a:bodyPr/>
           <a:lstStyle/>
           <a:p>
-            <a:fld id="{45C7489E-969B-49EA-82EC-3ACE3D17C8D8}" type="datetimeFigureOut">
+            <a:fld id="{8EFCF8AA-F9CD-BE43-9FDB-CA800991B15A}" type="datetime1">
               <a:rPr lang="en-US" smtClean="0"/>
-              <a:t>7/5/12</a:t>
+              <a:t>7/9/12</a:t>
             </a:fld>
             <a:endParaRPr lang="en-US"/>
           </a:p>
@@ -2280,9 +2796,9 @@
           <a:bodyPr/>
           <a:lstStyle/>
           <a:p>
-            <a:fld id="{45C7489E-969B-49EA-82EC-3ACE3D17C8D8}" type="datetimeFigureOut">
+            <a:fld id="{AB237E31-A67A-1F4C-B9A0-E025AB3F1910}" type="datetime1">
               <a:rPr lang="en-US" smtClean="0"/>
-              <a:t>7/5/12</a:t>
+              <a:t>7/9/12</a:t>
             </a:fld>
             <a:endParaRPr lang="en-US"/>
           </a:p>
@@ -2370,9 +2886,9 @@
           <a:bodyPr/>
           <a:lstStyle/>
           <a:p>
-            <a:fld id="{45C7489E-969B-49EA-82EC-3ACE3D17C8D8}" type="datetimeFigureOut">
+            <a:fld id="{77EB0B02-2E6D-5641-A8FD-A9CC43F53571}" type="datetime1">
               <a:rPr lang="en-US" smtClean="0"/>
-              <a:t>7/5/12</a:t>
+              <a:t>7/9/12</a:t>
             </a:fld>
             <a:endParaRPr lang="en-US"/>
           </a:p>
@@ -2744,9 +3260,9 @@
           <a:bodyPr/>
           <a:lstStyle/>
           <a:p>
-            <a:fld id="{45C7489E-969B-49EA-82EC-3ACE3D17C8D8}" type="datetimeFigureOut">
+            <a:fld id="{9D50740B-3BA0-6241-9956-5EBA4007AD45}" type="datetime1">
               <a:rPr lang="en-US" smtClean="0"/>
-              <a:t>7/5/12</a:t>
+              <a:t>7/9/12</a:t>
             </a:fld>
             <a:endParaRPr lang="en-US"/>
           </a:p>
@@ -2999,9 +3515,9 @@
           <a:bodyPr/>
           <a:lstStyle/>
           <a:p>
-            <a:fld id="{45C7489E-969B-49EA-82EC-3ACE3D17C8D8}" type="datetimeFigureOut">
+            <a:fld id="{A5FD6762-E8A7-3E4D-9013-8E481C64A100}" type="datetime1">
               <a:rPr lang="en-US" smtClean="0"/>
-              <a:t>7/5/12</a:t>
+              <a:t>7/9/12</a:t>
             </a:fld>
             <a:endParaRPr lang="en-US"/>
           </a:p>
@@ -3089,9 +3605,9 @@
           <a:bodyPr/>
           <a:lstStyle/>
           <a:p>
-            <a:fld id="{45C7489E-969B-49EA-82EC-3ACE3D17C8D8}" type="datetimeFigureOut">
+            <a:fld id="{9FE5D640-6435-5F4B-8C6F-8A35C7BCC29A}" type="datetime1">
               <a:rPr lang="en-US" smtClean="0"/>
-              <a:t>7/5/12</a:t>
+              <a:t>7/9/12</a:t>
             </a:fld>
             <a:endParaRPr lang="en-US"/>
           </a:p>
@@ -3363,9 +3879,9 @@
           <a:bodyPr/>
           <a:lstStyle/>
           <a:p>
-            <a:fld id="{45C7489E-969B-49EA-82EC-3ACE3D17C8D8}" type="datetimeFigureOut">
+            <a:fld id="{828E4C5B-7202-4343-8573-2E3FE581944A}" type="datetime1">
               <a:rPr lang="en-US" smtClean="0"/>
-              <a:t>7/5/12</a:t>
+              <a:t>7/9/12</a:t>
             </a:fld>
             <a:endParaRPr lang="en-US"/>
           </a:p>
@@ -3635,9 +4151,9 @@
           <a:bodyPr/>
           <a:lstStyle/>
           <a:p>
-            <a:fld id="{45C7489E-969B-49EA-82EC-3ACE3D17C8D8}" type="datetimeFigureOut">
+            <a:fld id="{DB95259F-66E4-3B4F-B7C5-1FA29269A57C}" type="datetime1">
               <a:rPr lang="en-US" smtClean="0"/>
-              <a:t>7/5/12</a:t>
+              <a:t>7/9/12</a:t>
             </a:fld>
             <a:endParaRPr lang="en-US"/>
           </a:p>
@@ -3935,9 +4451,9 @@
             </a:lvl1pPr>
           </a:lstStyle>
           <a:p>
-            <a:fld id="{45C7489E-969B-49EA-82EC-3ACE3D17C8D8}" type="datetimeFigureOut">
+            <a:fld id="{178FB6F8-A9EA-C04B-A771-0D18B5B184A5}" type="datetime1">
               <a:rPr lang="en-US" smtClean="0"/>
-              <a:t>7/5/12</a:t>
+              <a:t>7/9/12</a:t>
             </a:fld>
             <a:endParaRPr lang="en-US"/>
           </a:p>
@@ -4033,6 +4549,7 @@
     <p:sldLayoutId id="2147483670" r:id="rId10"/>
     <p:sldLayoutId id="2147483671" r:id="rId11"/>
   </p:sldLayoutIdLst>
+  <p:hf hdr="0" ftr="0" dt="0"/>
   <p:txStyles>
     <p:titleStyle>
       <a:lvl1pPr algn="l" defTabSz="914400" rtl="0" eaLnBrk="1" latinLnBrk="0" hangingPunct="1">
@@ -4477,6 +4994,29 @@
           </a:extLst>
         </p:spPr>
       </p:pic>
+      <p:sp>
+        <p:nvSpPr>
+          <p:cNvPr id="4" name="Slide Number Placeholder 3"/>
+          <p:cNvSpPr>
+            <a:spLocks noGrp="1"/>
+          </p:cNvSpPr>
+          <p:nvPr>
+            <p:ph type="sldNum" sz="quarter" idx="11"/>
+          </p:nvPr>
+        </p:nvSpPr>
+        <p:spPr/>
+        <p:txBody>
+          <a:bodyPr/>
+          <a:lstStyle/>
+          <a:p>
+            <a:fld id="{466192DD-7082-457C-A0B1-061B97E09436}" type="slidenum">
+              <a:rPr lang="en-US" smtClean="0"/>
+              <a:t>1</a:t>
+            </a:fld>
+            <a:endParaRPr lang="en-US"/>
+          </a:p>
+        </p:txBody>
+      </p:sp>
     </p:spTree>
     <p:extLst>
       <p:ext uri="{BB962C8B-B14F-4D97-AF65-F5344CB8AC3E}">
@@ -4498,6 +5038,343 @@
 </file>
 
 <file path=ppt/slides/slide10.xml><?xml version="1.0" encoding="utf-8"?>
+<p:sld xmlns:a="http://schemas.openxmlformats.org/drawingml/2006/main" xmlns:r="http://schemas.openxmlformats.org/officeDocument/2006/relationships" xmlns:p="http://schemas.openxmlformats.org/presentationml/2006/main">
+  <p:cSld>
+    <p:spTree>
+      <p:nvGrpSpPr>
+        <p:cNvPr id="1" name=""/>
+        <p:cNvGrpSpPr/>
+        <p:nvPr/>
+      </p:nvGrpSpPr>
+      <p:grpSpPr>
+        <a:xfrm>
+          <a:off x="0" y="0"/>
+          <a:ext cx="0" cy="0"/>
+          <a:chOff x="0" y="0"/>
+          <a:chExt cx="0" cy="0"/>
+        </a:xfrm>
+      </p:grpSpPr>
+      <p:sp>
+        <p:nvSpPr>
+          <p:cNvPr id="2" name="Titel 1"/>
+          <p:cNvSpPr>
+            <a:spLocks noGrp="1"/>
+          </p:cNvSpPr>
+          <p:nvPr>
+            <p:ph type="title"/>
+          </p:nvPr>
+        </p:nvSpPr>
+        <p:spPr/>
+        <p:txBody>
+          <a:bodyPr/>
+          <a:lstStyle/>
+          <a:p>
+            <a:r>
+              <a:rPr lang="de-DE" dirty="0" smtClean="0"/>
+              <a:t>HPAs</a:t>
+            </a:r>
+            <a:endParaRPr lang="en-US" dirty="0"/>
+          </a:p>
+        </p:txBody>
+      </p:sp>
+      <p:sp>
+        <p:nvSpPr>
+          <p:cNvPr id="3" name="Inhaltsplatzhalter 2"/>
+          <p:cNvSpPr>
+            <a:spLocks noGrp="1"/>
+          </p:cNvSpPr>
+          <p:nvPr>
+            <p:ph idx="1"/>
+          </p:nvPr>
+        </p:nvSpPr>
+        <p:spPr/>
+        <p:txBody>
+          <a:bodyPr/>
+          <a:lstStyle/>
+          <a:p>
+            <a:r>
+              <a:rPr lang="en-US" dirty="0" err="1" smtClean="0"/>
+              <a:t>OData</a:t>
+            </a:r>
+            <a:r>
+              <a:rPr lang="en-US" dirty="0" smtClean="0"/>
+              <a:t> in context of High Performance Applications</a:t>
+            </a:r>
+          </a:p>
+          <a:p>
+            <a:r>
+              <a:rPr lang="de-DE" dirty="0" smtClean="0"/>
+              <a:t>Modern HTML5 </a:t>
+            </a:r>
+            <a:r>
+              <a:rPr lang="en-US" dirty="0" smtClean="0"/>
+              <a:t>web applications</a:t>
+            </a:r>
+          </a:p>
+          <a:p>
+            <a:r>
+              <a:rPr lang="en-US" dirty="0" smtClean="0"/>
+              <a:t>Most of the code is JavaScript (90%)</a:t>
+            </a:r>
+          </a:p>
+          <a:p>
+            <a:r>
+              <a:rPr lang="en-US" dirty="0" smtClean="0"/>
+              <a:t>Using </a:t>
+            </a:r>
+            <a:r>
+              <a:rPr lang="en-US" dirty="0" err="1" smtClean="0"/>
+              <a:t>OData</a:t>
+            </a:r>
+            <a:r>
+              <a:rPr lang="en-US" dirty="0" smtClean="0"/>
+              <a:t> for communication</a:t>
+            </a:r>
+          </a:p>
+          <a:p>
+            <a:pPr lvl="1"/>
+            <a:r>
+              <a:rPr lang="en-US" dirty="0" smtClean="0"/>
+              <a:t>HANA </a:t>
+            </a:r>
+            <a:r>
+              <a:rPr lang="en-US" dirty="0" err="1" smtClean="0"/>
+              <a:t>OData</a:t>
+            </a:r>
+            <a:r>
+              <a:rPr lang="en-US" dirty="0" smtClean="0"/>
+              <a:t> Server available</a:t>
+            </a:r>
+          </a:p>
+          <a:p>
+            <a:pPr lvl="1"/>
+            <a:r>
+              <a:rPr lang="en-US" dirty="0" smtClean="0"/>
+              <a:t>Great for read access</a:t>
+            </a:r>
+          </a:p>
+          <a:p>
+            <a:pPr lvl="1"/>
+            <a:r>
+              <a:rPr lang="en-US" dirty="0" smtClean="0"/>
+              <a:t>Bad for writing access</a:t>
+            </a:r>
+            <a:endParaRPr lang="en-US" dirty="0"/>
+          </a:p>
+        </p:txBody>
+      </p:sp>
+      <p:sp>
+        <p:nvSpPr>
+          <p:cNvPr id="4" name="Slide Number Placeholder 3"/>
+          <p:cNvSpPr>
+            <a:spLocks noGrp="1"/>
+          </p:cNvSpPr>
+          <p:nvPr>
+            <p:ph type="sldNum" sz="quarter" idx="12"/>
+          </p:nvPr>
+        </p:nvSpPr>
+        <p:spPr/>
+        <p:txBody>
+          <a:bodyPr/>
+          <a:lstStyle/>
+          <a:p>
+            <a:fld id="{466192DD-7082-457C-A0B1-061B97E09436}" type="slidenum">
+              <a:rPr lang="en-US" smtClean="0"/>
+              <a:t>10</a:t>
+            </a:fld>
+            <a:endParaRPr lang="en-US"/>
+          </a:p>
+        </p:txBody>
+      </p:sp>
+    </p:spTree>
+    <p:extLst>
+      <p:ext uri="{BB962C8B-B14F-4D97-AF65-F5344CB8AC3E}">
+        <p14:creationId xmlns:p14="http://schemas.microsoft.com/office/powerpoint/2010/main" val="1951603237"/>
+      </p:ext>
+    </p:extLst>
+  </p:cSld>
+  <p:clrMapOvr>
+    <a:masterClrMapping/>
+  </p:clrMapOvr>
+  <p:timing>
+    <p:tnLst>
+      <p:par>
+        <p:cTn xmlns:p14="http://schemas.microsoft.com/office/powerpoint/2010/main" id="1" dur="indefinite" restart="never" nodeType="tmRoot"/>
+      </p:par>
+    </p:tnLst>
+  </p:timing>
+</p:sld>
+</file>
+
+<file path=ppt/slides/slide11.xml><?xml version="1.0" encoding="utf-8"?>
+<p:sld xmlns:a="http://schemas.openxmlformats.org/drawingml/2006/main" xmlns:r="http://schemas.openxmlformats.org/officeDocument/2006/relationships" xmlns:p="http://schemas.openxmlformats.org/presentationml/2006/main">
+  <p:cSld>
+    <p:spTree>
+      <p:nvGrpSpPr>
+        <p:cNvPr id="1" name=""/>
+        <p:cNvGrpSpPr/>
+        <p:nvPr/>
+      </p:nvGrpSpPr>
+      <p:grpSpPr>
+        <a:xfrm>
+          <a:off x="0" y="0"/>
+          <a:ext cx="0" cy="0"/>
+          <a:chOff x="0" y="0"/>
+          <a:chExt cx="0" cy="0"/>
+        </a:xfrm>
+      </p:grpSpPr>
+      <p:sp>
+        <p:nvSpPr>
+          <p:cNvPr id="2" name="Titel 1"/>
+          <p:cNvSpPr>
+            <a:spLocks noGrp="1"/>
+          </p:cNvSpPr>
+          <p:nvPr>
+            <p:ph type="title"/>
+          </p:nvPr>
+        </p:nvSpPr>
+        <p:spPr/>
+        <p:txBody>
+          <a:bodyPr/>
+          <a:lstStyle/>
+          <a:p>
+            <a:r>
+              <a:rPr lang="en-US" dirty="0" smtClean="0"/>
+              <a:t>Ideas</a:t>
+            </a:r>
+            <a:endParaRPr lang="en-US" dirty="0"/>
+          </a:p>
+        </p:txBody>
+      </p:sp>
+      <p:sp>
+        <p:nvSpPr>
+          <p:cNvPr id="3" name="Inhaltsplatzhalter 2"/>
+          <p:cNvSpPr>
+            <a:spLocks noGrp="1"/>
+          </p:cNvSpPr>
+          <p:nvPr>
+            <p:ph idx="1"/>
+          </p:nvPr>
+        </p:nvSpPr>
+        <p:spPr/>
+        <p:txBody>
+          <a:bodyPr/>
+          <a:lstStyle/>
+          <a:p>
+            <a:r>
+              <a:rPr lang="de-DE" dirty="0" smtClean="0"/>
+              <a:t>360/1100 = 32% LOC </a:t>
+            </a:r>
+            <a:r>
+              <a:rPr lang="de-DE" dirty="0" err="1" smtClean="0"/>
+              <a:t>OData</a:t>
+            </a:r>
+            <a:r>
+              <a:rPr lang="de-DE" dirty="0" smtClean="0"/>
+              <a:t> Service </a:t>
+            </a:r>
+            <a:r>
+              <a:rPr lang="de-DE" dirty="0" err="1" smtClean="0"/>
+              <a:t>Functions</a:t>
+            </a:r>
+            <a:endParaRPr lang="de-DE" dirty="0" smtClean="0"/>
+          </a:p>
+          <a:p>
+            <a:r>
+              <a:rPr lang="en-US" dirty="0" smtClean="0"/>
+              <a:t>Idea: </a:t>
+            </a:r>
+            <a:r>
+              <a:rPr lang="en-US" dirty="0" err="1" smtClean="0"/>
+              <a:t>OData</a:t>
+            </a:r>
+            <a:r>
+              <a:rPr lang="en-US" dirty="0" smtClean="0"/>
+              <a:t> ORM for JavaScript</a:t>
+            </a:r>
+          </a:p>
+          <a:p>
+            <a:pPr lvl="1"/>
+            <a:r>
+              <a:rPr lang="en-US" dirty="0" smtClean="0"/>
+              <a:t>Shorter syntax</a:t>
+            </a:r>
+          </a:p>
+          <a:p>
+            <a:pPr lvl="1"/>
+            <a:r>
+              <a:rPr lang="en-US" dirty="0" smtClean="0"/>
+              <a:t>Easier to express object creation</a:t>
+            </a:r>
+          </a:p>
+          <a:p>
+            <a:pPr lvl="1"/>
+            <a:r>
+              <a:rPr lang="en-US" dirty="0" smtClean="0"/>
+              <a:t>Explore Service automatically</a:t>
+            </a:r>
+          </a:p>
+          <a:p>
+            <a:pPr lvl="1"/>
+            <a:r>
+              <a:rPr lang="en-US" dirty="0" smtClean="0"/>
+              <a:t>Auto completion</a:t>
+            </a:r>
+          </a:p>
+          <a:p>
+            <a:pPr lvl="1"/>
+            <a:r>
+              <a:rPr lang="en-US" dirty="0" smtClean="0"/>
+              <a:t>Easier to read</a:t>
+            </a:r>
+            <a:endParaRPr lang="en-US" dirty="0"/>
+          </a:p>
+        </p:txBody>
+      </p:sp>
+      <p:sp>
+        <p:nvSpPr>
+          <p:cNvPr id="4" name="Slide Number Placeholder 3"/>
+          <p:cNvSpPr>
+            <a:spLocks noGrp="1"/>
+          </p:cNvSpPr>
+          <p:nvPr>
+            <p:ph type="sldNum" sz="quarter" idx="12"/>
+          </p:nvPr>
+        </p:nvSpPr>
+        <p:spPr/>
+        <p:txBody>
+          <a:bodyPr/>
+          <a:lstStyle/>
+          <a:p>
+            <a:fld id="{466192DD-7082-457C-A0B1-061B97E09436}" type="slidenum">
+              <a:rPr lang="en-US" smtClean="0"/>
+              <a:t>11</a:t>
+            </a:fld>
+            <a:endParaRPr lang="en-US"/>
+          </a:p>
+        </p:txBody>
+      </p:sp>
+    </p:spTree>
+    <p:extLst>
+      <p:ext uri="{BB962C8B-B14F-4D97-AF65-F5344CB8AC3E}">
+        <p14:creationId xmlns:p14="http://schemas.microsoft.com/office/powerpoint/2010/main" val="396667459"/>
+      </p:ext>
+    </p:extLst>
+  </p:cSld>
+  <p:clrMapOvr>
+    <a:masterClrMapping/>
+  </p:clrMapOvr>
+  <p:timing>
+    <p:tnLst>
+      <p:par>
+        <p:cTn xmlns:p14="http://schemas.microsoft.com/office/powerpoint/2010/main" id="1" dur="indefinite" restart="never" nodeType="tmRoot"/>
+      </p:par>
+    </p:tnLst>
+  </p:timing>
+</p:sld>
+</file>
+
+<file path=ppt/slides/slide12.xml><?xml version="1.0" encoding="utf-8"?>
 <p:sld xmlns:a="http://schemas.openxmlformats.org/drawingml/2006/main" xmlns:r="http://schemas.openxmlformats.org/officeDocument/2006/relationships" xmlns:p="http://schemas.openxmlformats.org/presentationml/2006/main">
   <p:cSld>
     <p:spTree>
@@ -4614,6 +5491,29 @@
           </a:extLst>
         </p:spPr>
       </p:pic>
+      <p:sp>
+        <p:nvSpPr>
+          <p:cNvPr id="4" name="Slide Number Placeholder 3"/>
+          <p:cNvSpPr>
+            <a:spLocks noGrp="1"/>
+          </p:cNvSpPr>
+          <p:nvPr>
+            <p:ph type="sldNum" sz="quarter" idx="12"/>
+          </p:nvPr>
+        </p:nvSpPr>
+        <p:spPr/>
+        <p:txBody>
+          <a:bodyPr/>
+          <a:lstStyle/>
+          <a:p>
+            <a:fld id="{466192DD-7082-457C-A0B1-061B97E09436}" type="slidenum">
+              <a:rPr lang="en-US" smtClean="0"/>
+              <a:t>12</a:t>
+            </a:fld>
+            <a:endParaRPr lang="en-US"/>
+          </a:p>
+        </p:txBody>
+      </p:sp>
     </p:spTree>
     <p:extLst>
       <p:ext uri="{BB962C8B-B14F-4D97-AF65-F5344CB8AC3E}">
@@ -4634,7 +5534,7 @@
 </p:sld>
 </file>
 
-<file path=ppt/slides/slide11.xml><?xml version="1.0" encoding="utf-8"?>
+<file path=ppt/slides/slide13.xml><?xml version="1.0" encoding="utf-8"?>
 <p:sld xmlns:a="http://schemas.openxmlformats.org/drawingml/2006/main" xmlns:r="http://schemas.openxmlformats.org/officeDocument/2006/relationships" xmlns:p="http://schemas.openxmlformats.org/presentationml/2006/main">
   <p:cSld>
     <p:spTree>
@@ -4721,11 +5621,7 @@
           <a:p>
             <a:r>
               <a:rPr lang="en-US" dirty="0" smtClean="0"/>
-              <a:t>OData is great for smaller analytics/publishing </a:t>
-            </a:r>
-            <a:r>
-              <a:rPr lang="en-US" dirty="0" smtClean="0"/>
-              <a:t>apps</a:t>
+              <a:t>OData is great for smaller analytics/publishing apps</a:t>
             </a:r>
           </a:p>
           <a:p>
@@ -4747,7 +5643,6 @@
               <a:rPr lang="en-US" dirty="0" smtClean="0"/>
               <a:t>One layer of complexity removed</a:t>
             </a:r>
-            <a:endParaRPr lang="en-US" dirty="0" smtClean="0"/>
           </a:p>
           <a:p>
             <a:endParaRPr lang="de-DE" dirty="0"/>
@@ -4772,6 +5667,29 @@
               <a:t>Transaction State</a:t>
             </a:r>
             <a:endParaRPr lang="en-US" dirty="0" smtClean="0"/>
+          </a:p>
+        </p:txBody>
+      </p:sp>
+      <p:sp>
+        <p:nvSpPr>
+          <p:cNvPr id="4" name="Slide Number Placeholder 3"/>
+          <p:cNvSpPr>
+            <a:spLocks noGrp="1"/>
+          </p:cNvSpPr>
+          <p:nvPr>
+            <p:ph type="sldNum" sz="quarter" idx="12"/>
+          </p:nvPr>
+        </p:nvSpPr>
+        <p:spPr/>
+        <p:txBody>
+          <a:bodyPr/>
+          <a:lstStyle/>
+          <a:p>
+            <a:fld id="{466192DD-7082-457C-A0B1-061B97E09436}" type="slidenum">
+              <a:rPr lang="en-US" smtClean="0"/>
+              <a:t>13</a:t>
+            </a:fld>
+            <a:endParaRPr lang="en-US"/>
           </a:p>
         </p:txBody>
       </p:sp>
@@ -4822,6 +5740,424 @@
       </p:grpSpPr>
       <p:sp>
         <p:nvSpPr>
+          <p:cNvPr id="2" name="Title 1"/>
+          <p:cNvSpPr>
+            <a:spLocks noGrp="1"/>
+          </p:cNvSpPr>
+          <p:nvPr>
+            <p:ph type="title"/>
+          </p:nvPr>
+        </p:nvSpPr>
+        <p:spPr/>
+        <p:txBody>
+          <a:bodyPr/>
+          <a:lstStyle/>
+          <a:p>
+            <a:r>
+              <a:rPr lang="en-US" dirty="0" smtClean="0"/>
+              <a:t>OData (revisited)</a:t>
+            </a:r>
+            <a:endParaRPr lang="en-US" dirty="0"/>
+          </a:p>
+        </p:txBody>
+      </p:sp>
+      <p:sp>
+        <p:nvSpPr>
+          <p:cNvPr id="3" name="Content Placeholder 2"/>
+          <p:cNvSpPr>
+            <a:spLocks noGrp="1"/>
+          </p:cNvSpPr>
+          <p:nvPr>
+            <p:ph idx="1"/>
+          </p:nvPr>
+        </p:nvSpPr>
+        <p:spPr/>
+        <p:txBody>
+          <a:bodyPr/>
+          <a:lstStyle/>
+          <a:p>
+            <a:r>
+              <a:rPr lang="en-US" dirty="0"/>
+              <a:t>W</a:t>
+            </a:r>
+            <a:r>
+              <a:rPr lang="en-US" dirty="0" smtClean="0"/>
+              <a:t>eb </a:t>
+            </a:r>
+            <a:r>
+              <a:rPr lang="en-US" dirty="0"/>
+              <a:t>protocol for querying and updating </a:t>
+            </a:r>
+            <a:r>
+              <a:rPr lang="en-US" dirty="0" smtClean="0"/>
+              <a:t>data</a:t>
+            </a:r>
+          </a:p>
+          <a:p>
+            <a:r>
+              <a:rPr lang="en-US" dirty="0" smtClean="0"/>
+              <a:t>Access database over HTTP</a:t>
+            </a:r>
+          </a:p>
+          <a:p>
+            <a:r>
+              <a:rPr lang="en-US" dirty="0" smtClean="0"/>
+              <a:t>Returns query results as JSON</a:t>
+            </a:r>
+          </a:p>
+        </p:txBody>
+      </p:sp>
+      <p:pic>
+        <p:nvPicPr>
+          <p:cNvPr id="4" name="Picture 2"/>
+          <p:cNvPicPr>
+            <a:picLocks noChangeAspect="1" noChangeArrowheads="1"/>
+          </p:cNvPicPr>
+          <p:nvPr/>
+        </p:nvPicPr>
+        <p:blipFill rotWithShape="1">
+          <a:blip r:embed="rId2">
+            <a:extLst>
+              <a:ext uri="{28A0092B-C50C-407E-A947-70E740481C1C}">
+                <a14:useLocalDpi xmlns:a14="http://schemas.microsoft.com/office/drawing/2010/main" val="0"/>
+              </a:ext>
+            </a:extLst>
+          </a:blip>
+          <a:srcRect l="14761" t="38358" r="25873" b="26699"/>
+          <a:stretch/>
+        </p:blipFill>
+        <p:spPr bwMode="auto">
+          <a:xfrm>
+            <a:off x="755576" y="4073413"/>
+            <a:ext cx="7704856" cy="2739963"/>
+          </a:xfrm>
+          <a:prstGeom prst="rect">
+            <a:avLst/>
+          </a:prstGeom>
+          <a:ln>
+            <a:noFill/>
+          </a:ln>
+          <a:effectLst>
+            <a:outerShdw blurRad="190500" algn="tl" rotWithShape="0">
+              <a:srgbClr val="000000">
+                <a:alpha val="70000"/>
+              </a:srgbClr>
+            </a:outerShdw>
+          </a:effectLst>
+          <a:extLst>
+            <a:ext uri="{909E8E84-426E-40dd-AFC4-6F175D3DCCD1}">
+              <a14:hiddenFill xmlns:a14="http://schemas.microsoft.com/office/drawing/2010/main">
+                <a:solidFill>
+                  <a:schemeClr val="accent1"/>
+                </a:solidFill>
+              </a14:hiddenFill>
+            </a:ext>
+            <a:ext uri="{91240B29-F687-4f45-9708-019B960494DF}">
+              <a14:hiddenLine xmlns:a14="http://schemas.microsoft.com/office/drawing/2010/main" w="9525">
+                <a:solidFill>
+                  <a:schemeClr val="tx1"/>
+                </a:solidFill>
+                <a:miter lim="800000"/>
+                <a:headEnd/>
+                <a:tailEnd/>
+              </a14:hiddenLine>
+            </a:ext>
+          </a:extLst>
+        </p:spPr>
+      </p:pic>
+      <p:sp>
+        <p:nvSpPr>
+          <p:cNvPr id="5" name="Slide Number Placeholder 4"/>
+          <p:cNvSpPr>
+            <a:spLocks noGrp="1"/>
+          </p:cNvSpPr>
+          <p:nvPr>
+            <p:ph type="sldNum" sz="quarter" idx="12"/>
+          </p:nvPr>
+        </p:nvSpPr>
+        <p:spPr/>
+        <p:txBody>
+          <a:bodyPr/>
+          <a:lstStyle/>
+          <a:p>
+            <a:fld id="{466192DD-7082-457C-A0B1-061B97E09436}" type="slidenum">
+              <a:rPr lang="en-US" smtClean="0"/>
+              <a:t>2</a:t>
+            </a:fld>
+            <a:endParaRPr lang="en-US"/>
+          </a:p>
+        </p:txBody>
+      </p:sp>
+    </p:spTree>
+    <p:extLst>
+      <p:ext uri="{BB962C8B-B14F-4D97-AF65-F5344CB8AC3E}">
+        <p14:creationId xmlns:p14="http://schemas.microsoft.com/office/powerpoint/2010/main" val="2873287731"/>
+      </p:ext>
+    </p:extLst>
+  </p:cSld>
+  <p:clrMapOvr>
+    <a:masterClrMapping/>
+  </p:clrMapOvr>
+</p:sld>
+</file>
+
+<file path=ppt/slides/slide3.xml><?xml version="1.0" encoding="utf-8"?>
+<p:sld xmlns:a="http://schemas.openxmlformats.org/drawingml/2006/main" xmlns:r="http://schemas.openxmlformats.org/officeDocument/2006/relationships" xmlns:p="http://schemas.openxmlformats.org/presentationml/2006/main">
+  <p:cSld>
+    <p:spTree>
+      <p:nvGrpSpPr>
+        <p:cNvPr id="1" name=""/>
+        <p:cNvGrpSpPr/>
+        <p:nvPr/>
+      </p:nvGrpSpPr>
+      <p:grpSpPr>
+        <a:xfrm>
+          <a:off x="0" y="0"/>
+          <a:ext cx="0" cy="0"/>
+          <a:chOff x="0" y="0"/>
+          <a:chExt cx="0" cy="0"/>
+        </a:xfrm>
+      </p:grpSpPr>
+      <p:sp>
+        <p:nvSpPr>
+          <p:cNvPr id="2" name="Title 1"/>
+          <p:cNvSpPr>
+            <a:spLocks noGrp="1"/>
+          </p:cNvSpPr>
+          <p:nvPr>
+            <p:ph type="title"/>
+          </p:nvPr>
+        </p:nvSpPr>
+        <p:spPr/>
+        <p:txBody>
+          <a:bodyPr/>
+          <a:lstStyle/>
+          <a:p>
+            <a:r>
+              <a:rPr lang="en-US" dirty="0" smtClean="0"/>
+              <a:t>OData (revisited)</a:t>
+            </a:r>
+            <a:endParaRPr lang="en-US" dirty="0"/>
+          </a:p>
+        </p:txBody>
+      </p:sp>
+      <p:sp>
+        <p:nvSpPr>
+          <p:cNvPr id="3" name="Content Placeholder 2"/>
+          <p:cNvSpPr>
+            <a:spLocks noGrp="1"/>
+          </p:cNvSpPr>
+          <p:nvPr>
+            <p:ph idx="1"/>
+          </p:nvPr>
+        </p:nvSpPr>
+        <p:spPr/>
+        <p:txBody>
+          <a:bodyPr/>
+          <a:lstStyle/>
+          <a:p>
+            <a:r>
+              <a:rPr lang="en-US" dirty="0"/>
+              <a:t>W</a:t>
+            </a:r>
+            <a:r>
+              <a:rPr lang="en-US" dirty="0" smtClean="0"/>
+              <a:t>eb </a:t>
+            </a:r>
+            <a:r>
+              <a:rPr lang="en-US" dirty="0"/>
+              <a:t>protocol for querying and updating </a:t>
+            </a:r>
+            <a:r>
+              <a:rPr lang="en-US" dirty="0" smtClean="0"/>
+              <a:t>data</a:t>
+            </a:r>
+          </a:p>
+          <a:p>
+            <a:r>
+              <a:rPr lang="en-US" dirty="0" smtClean="0"/>
+              <a:t>Access database over HTTP</a:t>
+            </a:r>
+          </a:p>
+          <a:p>
+            <a:r>
+              <a:rPr lang="en-US" dirty="0" smtClean="0"/>
+              <a:t>Returns query results as JSON</a:t>
+            </a:r>
+          </a:p>
+        </p:txBody>
+      </p:sp>
+      <p:pic>
+        <p:nvPicPr>
+          <p:cNvPr id="4" name="Picture 2"/>
+          <p:cNvPicPr>
+            <a:picLocks noChangeAspect="1" noChangeArrowheads="1"/>
+          </p:cNvPicPr>
+          <p:nvPr/>
+        </p:nvPicPr>
+        <p:blipFill rotWithShape="1">
+          <a:blip r:embed="rId2">
+            <a:extLst>
+              <a:ext uri="{28A0092B-C50C-407E-A947-70E740481C1C}">
+                <a14:useLocalDpi xmlns:a14="http://schemas.microsoft.com/office/drawing/2010/main" val="0"/>
+              </a:ext>
+            </a:extLst>
+          </a:blip>
+          <a:srcRect l="14761" t="38358" r="25873" b="26699"/>
+          <a:stretch/>
+        </p:blipFill>
+        <p:spPr bwMode="auto">
+          <a:xfrm>
+            <a:off x="755576" y="4073413"/>
+            <a:ext cx="7704856" cy="2739963"/>
+          </a:xfrm>
+          <a:prstGeom prst="rect">
+            <a:avLst/>
+          </a:prstGeom>
+          <a:ln>
+            <a:noFill/>
+          </a:ln>
+          <a:effectLst>
+            <a:outerShdw blurRad="190500" algn="tl" rotWithShape="0">
+              <a:srgbClr val="000000">
+                <a:alpha val="70000"/>
+              </a:srgbClr>
+            </a:outerShdw>
+          </a:effectLst>
+          <a:extLst>
+            <a:ext uri="{909E8E84-426E-40dd-AFC4-6F175D3DCCD1}">
+              <a14:hiddenFill xmlns:a14="http://schemas.microsoft.com/office/drawing/2010/main">
+                <a:solidFill>
+                  <a:schemeClr val="accent1"/>
+                </a:solidFill>
+              </a14:hiddenFill>
+            </a:ext>
+            <a:ext uri="{91240B29-F687-4f45-9708-019B960494DF}">
+              <a14:hiddenLine xmlns:a14="http://schemas.microsoft.com/office/drawing/2010/main" w="9525">
+                <a:solidFill>
+                  <a:schemeClr val="tx1"/>
+                </a:solidFill>
+                <a:miter lim="800000"/>
+                <a:headEnd/>
+                <a:tailEnd/>
+              </a14:hiddenLine>
+            </a:ext>
+          </a:extLst>
+        </p:spPr>
+      </p:pic>
+      <p:pic>
+        <p:nvPicPr>
+          <p:cNvPr id="5" name="Picture 2"/>
+          <p:cNvPicPr>
+            <a:picLocks noChangeAspect="1" noChangeArrowheads="1"/>
+          </p:cNvPicPr>
+          <p:nvPr/>
+        </p:nvPicPr>
+        <p:blipFill rotWithShape="1">
+          <a:blip r:embed="rId3">
+            <a:extLst>
+              <a:ext uri="{28A0092B-C50C-407E-A947-70E740481C1C}">
+                <a14:useLocalDpi xmlns:a14="http://schemas.microsoft.com/office/drawing/2010/main" val="0"/>
+              </a:ext>
+            </a:extLst>
+          </a:blip>
+          <a:srcRect l="15397" t="17340" r="26508" b="49425"/>
+          <a:stretch/>
+        </p:blipFill>
+        <p:spPr bwMode="auto">
+          <a:xfrm>
+            <a:off x="755576" y="4077072"/>
+            <a:ext cx="7890914" cy="2727324"/>
+          </a:xfrm>
+          <a:prstGeom prst="rect">
+            <a:avLst/>
+          </a:prstGeom>
+          <a:ln>
+            <a:noFill/>
+          </a:ln>
+          <a:effectLst>
+            <a:outerShdw blurRad="190500" algn="tl" rotWithShape="0">
+              <a:srgbClr val="000000">
+                <a:alpha val="70000"/>
+              </a:srgbClr>
+            </a:outerShdw>
+          </a:effectLst>
+          <a:extLst>
+            <a:ext uri="{909E8E84-426E-40dd-AFC4-6F175D3DCCD1}">
+              <a14:hiddenFill xmlns:a14="http://schemas.microsoft.com/office/drawing/2010/main">
+                <a:solidFill>
+                  <a:schemeClr val="accent1"/>
+                </a:solidFill>
+              </a14:hiddenFill>
+            </a:ext>
+            <a:ext uri="{91240B29-F687-4f45-9708-019B960494DF}">
+              <a14:hiddenLine xmlns:a14="http://schemas.microsoft.com/office/drawing/2010/main" w="9525">
+                <a:solidFill>
+                  <a:schemeClr val="tx1"/>
+                </a:solidFill>
+                <a:miter lim="800000"/>
+                <a:headEnd/>
+                <a:tailEnd/>
+              </a14:hiddenLine>
+            </a:ext>
+          </a:extLst>
+        </p:spPr>
+      </p:pic>
+      <p:sp>
+        <p:nvSpPr>
+          <p:cNvPr id="6" name="Slide Number Placeholder 5"/>
+          <p:cNvSpPr>
+            <a:spLocks noGrp="1"/>
+          </p:cNvSpPr>
+          <p:nvPr>
+            <p:ph type="sldNum" sz="quarter" idx="12"/>
+          </p:nvPr>
+        </p:nvSpPr>
+        <p:spPr/>
+        <p:txBody>
+          <a:bodyPr/>
+          <a:lstStyle/>
+          <a:p>
+            <a:fld id="{466192DD-7082-457C-A0B1-061B97E09436}" type="slidenum">
+              <a:rPr lang="en-US" smtClean="0"/>
+              <a:t>3</a:t>
+            </a:fld>
+            <a:endParaRPr lang="en-US"/>
+          </a:p>
+        </p:txBody>
+      </p:sp>
+    </p:spTree>
+    <p:extLst>
+      <p:ext uri="{BB962C8B-B14F-4D97-AF65-F5344CB8AC3E}">
+        <p14:creationId xmlns:p14="http://schemas.microsoft.com/office/powerpoint/2010/main" val="1008445733"/>
+      </p:ext>
+    </p:extLst>
+  </p:cSld>
+  <p:clrMapOvr>
+    <a:masterClrMapping/>
+  </p:clrMapOvr>
+</p:sld>
+</file>
+
+<file path=ppt/slides/slide4.xml><?xml version="1.0" encoding="utf-8"?>
+<p:sld xmlns:a="http://schemas.openxmlformats.org/drawingml/2006/main" xmlns:r="http://schemas.openxmlformats.org/officeDocument/2006/relationships" xmlns:p="http://schemas.openxmlformats.org/presentationml/2006/main">
+  <p:cSld>
+    <p:spTree>
+      <p:nvGrpSpPr>
+        <p:cNvPr id="1" name=""/>
+        <p:cNvGrpSpPr/>
+        <p:nvPr/>
+      </p:nvGrpSpPr>
+      <p:grpSpPr>
+        <a:xfrm>
+          <a:off x="0" y="0"/>
+          <a:ext cx="0" cy="0"/>
+          <a:chOff x="0" y="0"/>
+          <a:chExt cx="0" cy="0"/>
+        </a:xfrm>
+      </p:grpSpPr>
+      <p:sp>
+        <p:nvSpPr>
           <p:cNvPr id="2" name="Titel 1"/>
           <p:cNvSpPr>
             <a:spLocks noGrp="1"/>
@@ -4909,6 +6245,29 @@
               <a:t>Ideas for improvement</a:t>
             </a:r>
             <a:endParaRPr lang="en-US" dirty="0"/>
+          </a:p>
+        </p:txBody>
+      </p:sp>
+      <p:sp>
+        <p:nvSpPr>
+          <p:cNvPr id="4" name="Slide Number Placeholder 3"/>
+          <p:cNvSpPr>
+            <a:spLocks noGrp="1"/>
+          </p:cNvSpPr>
+          <p:nvPr>
+            <p:ph type="sldNum" sz="quarter" idx="12"/>
+          </p:nvPr>
+        </p:nvSpPr>
+        <p:spPr/>
+        <p:txBody>
+          <a:bodyPr/>
+          <a:lstStyle/>
+          <a:p>
+            <a:fld id="{466192DD-7082-457C-A0B1-061B97E09436}" type="slidenum">
+              <a:rPr lang="en-US" smtClean="0"/>
+              <a:t>4</a:t>
+            </a:fld>
+            <a:endParaRPr lang="en-US"/>
           </a:p>
         </p:txBody>
       </p:sp>
@@ -4932,7 +6291,7 @@
 </p:sld>
 </file>
 
-<file path=ppt/slides/slide3.xml><?xml version="1.0" encoding="utf-8"?>
+<file path=ppt/slides/slide5.xml><?xml version="1.0" encoding="utf-8"?>
 <p:sld xmlns:a="http://schemas.openxmlformats.org/drawingml/2006/main" xmlns:r="http://schemas.openxmlformats.org/officeDocument/2006/relationships" xmlns:p="http://schemas.openxmlformats.org/presentationml/2006/main">
   <p:cSld>
     <p:spTree>
@@ -5631,6 +6990,29 @@
           </a:p>
         </p:txBody>
       </p:sp>
+      <p:sp>
+        <p:nvSpPr>
+          <p:cNvPr id="3" name="Slide Number Placeholder 2"/>
+          <p:cNvSpPr>
+            <a:spLocks noGrp="1"/>
+          </p:cNvSpPr>
+          <p:nvPr>
+            <p:ph type="sldNum" sz="quarter" idx="12"/>
+          </p:nvPr>
+        </p:nvSpPr>
+        <p:spPr/>
+        <p:txBody>
+          <a:bodyPr/>
+          <a:lstStyle/>
+          <a:p>
+            <a:fld id="{466192DD-7082-457C-A0B1-061B97E09436}" type="slidenum">
+              <a:rPr lang="en-US" smtClean="0"/>
+              <a:t>5</a:t>
+            </a:fld>
+            <a:endParaRPr lang="en-US"/>
+          </a:p>
+        </p:txBody>
+      </p:sp>
     </p:spTree>
     <p:extLst>
       <p:ext uri="{BB962C8B-B14F-4D97-AF65-F5344CB8AC3E}">
@@ -5651,7 +7033,7 @@
 </p:sld>
 </file>
 
-<file path=ppt/slides/slide4.xml><?xml version="1.0" encoding="utf-8"?>
+<file path=ppt/slides/slide6.xml><?xml version="1.0" encoding="utf-8"?>
 <p:sld xmlns:a="http://schemas.openxmlformats.org/drawingml/2006/main" xmlns:r="http://schemas.openxmlformats.org/officeDocument/2006/relationships" xmlns:p="http://schemas.openxmlformats.org/presentationml/2006/main" show="0">
   <p:cSld>
     <p:spTree>
@@ -5772,6 +7154,29 @@
           </a:extLst>
         </p:spPr>
       </p:pic>
+      <p:sp>
+        <p:nvSpPr>
+          <p:cNvPr id="4" name="Slide Number Placeholder 3"/>
+          <p:cNvSpPr>
+            <a:spLocks noGrp="1"/>
+          </p:cNvSpPr>
+          <p:nvPr>
+            <p:ph type="sldNum" sz="quarter" idx="12"/>
+          </p:nvPr>
+        </p:nvSpPr>
+        <p:spPr/>
+        <p:txBody>
+          <a:bodyPr/>
+          <a:lstStyle/>
+          <a:p>
+            <a:fld id="{466192DD-7082-457C-A0B1-061B97E09436}" type="slidenum">
+              <a:rPr lang="en-US" smtClean="0"/>
+              <a:t>6</a:t>
+            </a:fld>
+            <a:endParaRPr lang="en-US"/>
+          </a:p>
+        </p:txBody>
+      </p:sp>
     </p:spTree>
     <p:extLst>
       <p:ext uri="{BB962C8B-B14F-4D97-AF65-F5344CB8AC3E}">
@@ -5782,444 +7187,14 @@
   <p:clrMapOvr>
     <a:masterClrMapping/>
   </p:clrMapOvr>
-  <mc:AlternateContent xmlns:mc="http://schemas.openxmlformats.org/markup-compatibility/2006">
-    <mc:Choice xmlns:p14="http://schemas.microsoft.com/office/powerpoint/2010/main" Requires="p14">
+  <mc:AlternateContent xmlns:mc="http://schemas.openxmlformats.org/markup-compatibility/2006" xmlns:p14="http://schemas.microsoft.com/office/powerpoint/2010/main">
+    <mc:Choice Requires="p14">
       <p:transition spd="slow" p14:dur="2000"/>
     </mc:Choice>
-    <mc:Fallback>
+    <mc:Fallback xmlns="">
       <p:transition xmlns:p14="http://schemas.microsoft.com/office/powerpoint/2010/main" spd="slow"/>
     </mc:Fallback>
   </mc:AlternateContent>
-  <p:timing>
-    <p:tnLst>
-      <p:par>
-        <p:cTn xmlns:p14="http://schemas.microsoft.com/office/powerpoint/2010/main" id="1" dur="indefinite" restart="never" nodeType="tmRoot"/>
-      </p:par>
-    </p:tnLst>
-  </p:timing>
-</p:sld>
-</file>
-
-<file path=ppt/slides/slide5.xml><?xml version="1.0" encoding="utf-8"?>
-<p:sld xmlns:a="http://schemas.openxmlformats.org/drawingml/2006/main" xmlns:r="http://schemas.openxmlformats.org/officeDocument/2006/relationships" xmlns:p="http://schemas.openxmlformats.org/presentationml/2006/main">
-  <p:cSld>
-    <p:spTree>
-      <p:nvGrpSpPr>
-        <p:cNvPr id="1" name=""/>
-        <p:cNvGrpSpPr/>
-        <p:nvPr/>
-      </p:nvGrpSpPr>
-      <p:grpSpPr>
-        <a:xfrm>
-          <a:off x="0" y="0"/>
-          <a:ext cx="0" cy="0"/>
-          <a:chOff x="0" y="0"/>
-          <a:chExt cx="0" cy="0"/>
-        </a:xfrm>
-      </p:grpSpPr>
-      <p:sp>
-        <p:nvSpPr>
-          <p:cNvPr id="2" name="Titel 1"/>
-          <p:cNvSpPr>
-            <a:spLocks noGrp="1"/>
-          </p:cNvSpPr>
-          <p:nvPr>
-            <p:ph type="title"/>
-          </p:nvPr>
-        </p:nvSpPr>
-        <p:spPr/>
-        <p:txBody>
-          <a:bodyPr/>
-          <a:lstStyle/>
-          <a:p>
-            <a:r>
-              <a:rPr lang="de-DE" dirty="0" smtClean="0"/>
-              <a:t>Data Overhead/Performance</a:t>
-            </a:r>
-            <a:endParaRPr lang="en-US" dirty="0"/>
-          </a:p>
-        </p:txBody>
-      </p:sp>
-      <p:sp>
-        <p:nvSpPr>
-          <p:cNvPr id="3" name="Inhaltsplatzhalter 2"/>
-          <p:cNvSpPr>
-            <a:spLocks noGrp="1"/>
-          </p:cNvSpPr>
-          <p:nvPr>
-            <p:ph idx="1"/>
-          </p:nvPr>
-        </p:nvSpPr>
-        <p:spPr/>
-        <p:txBody>
-          <a:bodyPr/>
-          <a:lstStyle/>
-          <a:p>
-            <a:r>
-              <a:rPr lang="en-US" dirty="0" smtClean="0"/>
-              <a:t>JSON better than Atom</a:t>
-            </a:r>
-          </a:p>
-          <a:p>
-            <a:r>
-              <a:rPr lang="en-US" dirty="0" smtClean="0"/>
-              <a:t>JSON format</a:t>
-            </a:r>
-          </a:p>
-          <a:p>
-            <a:pPr lvl="1"/>
-            <a:r>
-              <a:rPr lang="en-US" dirty="0" smtClean="0"/>
-              <a:t>URL for foreign keys</a:t>
-            </a:r>
-          </a:p>
-          <a:p>
-            <a:pPr lvl="1"/>
-            <a:r>
-              <a:rPr lang="en-US" dirty="0" smtClean="0"/>
-              <a:t>Property names for each entry</a:t>
-            </a:r>
-          </a:p>
-          <a:p>
-            <a:endParaRPr lang="en-US" dirty="0"/>
-          </a:p>
-        </p:txBody>
-      </p:sp>
-      <p:pic>
-        <p:nvPicPr>
-          <p:cNvPr id="1026" name="Picture 2" descr="EfficientFormatPayloadBreakdown"/>
-          <p:cNvPicPr>
-            <a:picLocks noChangeAspect="1" noChangeArrowheads="1"/>
-          </p:cNvPicPr>
-          <p:nvPr/>
-        </p:nvPicPr>
-        <p:blipFill>
-          <a:blip r:embed="rId3">
-            <a:extLst>
-              <a:ext uri="{28A0092B-C50C-407E-A947-70E740481C1C}">
-                <a14:useLocalDpi xmlns:a14="http://schemas.microsoft.com/office/drawing/2010/main" val="0"/>
-              </a:ext>
-            </a:extLst>
-          </a:blip>
-          <a:srcRect/>
-          <a:stretch>
-            <a:fillRect/>
-          </a:stretch>
-        </p:blipFill>
-        <p:spPr bwMode="auto">
-          <a:xfrm>
-            <a:off x="4860032" y="2767754"/>
-            <a:ext cx="3954269" cy="2232248"/>
-          </a:xfrm>
-          <a:prstGeom prst="rect">
-            <a:avLst/>
-          </a:prstGeom>
-          <a:noFill/>
-          <a:extLst>
-            <a:ext uri="{909E8E84-426E-40dd-AFC4-6F175D3DCCD1}">
-              <a14:hiddenFill xmlns:a14="http://schemas.microsoft.com/office/drawing/2010/main">
-                <a:solidFill>
-                  <a:srgbClr val="FFFFFF"/>
-                </a:solidFill>
-              </a14:hiddenFill>
-            </a:ext>
-          </a:extLst>
-        </p:spPr>
-      </p:pic>
-    </p:spTree>
-    <p:extLst>
-      <p:ext uri="{BB962C8B-B14F-4D97-AF65-F5344CB8AC3E}">
-        <p14:creationId xmlns:p14="http://schemas.microsoft.com/office/powerpoint/2010/main" val="2318432606"/>
-      </p:ext>
-    </p:extLst>
-  </p:cSld>
-  <p:clrMapOvr>
-    <a:masterClrMapping/>
-  </p:clrMapOvr>
-  <p:timing>
-    <p:tnLst>
-      <p:par>
-        <p:cTn xmlns:p14="http://schemas.microsoft.com/office/powerpoint/2010/main" id="1" dur="indefinite" restart="never" nodeType="tmRoot"/>
-      </p:par>
-    </p:tnLst>
-  </p:timing>
-</p:sld>
-</file>
-
-<file path=ppt/slides/slide6.xml><?xml version="1.0" encoding="utf-8"?>
-<p:sld xmlns:a="http://schemas.openxmlformats.org/drawingml/2006/main" xmlns:r="http://schemas.openxmlformats.org/officeDocument/2006/relationships" xmlns:p="http://schemas.openxmlformats.org/presentationml/2006/main">
-  <p:cSld>
-    <p:spTree>
-      <p:nvGrpSpPr>
-        <p:cNvPr id="1" name=""/>
-        <p:cNvGrpSpPr/>
-        <p:nvPr/>
-      </p:nvGrpSpPr>
-      <p:grpSpPr>
-        <a:xfrm>
-          <a:off x="0" y="0"/>
-          <a:ext cx="0" cy="0"/>
-          <a:chOff x="0" y="0"/>
-          <a:chExt cx="0" cy="0"/>
-        </a:xfrm>
-      </p:grpSpPr>
-      <p:sp>
-        <p:nvSpPr>
-          <p:cNvPr id="11" name="Inhaltsplatzhalter 2"/>
-          <p:cNvSpPr>
-            <a:spLocks noGrp="1"/>
-          </p:cNvSpPr>
-          <p:nvPr>
-            <p:ph idx="1"/>
-          </p:nvPr>
-        </p:nvSpPr>
-        <p:spPr>
-          <a:xfrm>
-            <a:off x="914400" y="2769833"/>
-            <a:ext cx="7315200" cy="3539527"/>
-          </a:xfrm>
-        </p:spPr>
-        <p:txBody>
-          <a:bodyPr>
-            <a:normAutofit/>
-          </a:bodyPr>
-          <a:lstStyle/>
-          <a:p>
-            <a:r>
-              <a:rPr lang="en-US" dirty="0" smtClean="0"/>
-              <a:t>Complete asynchronous communication</a:t>
-            </a:r>
-          </a:p>
-          <a:p>
-            <a:r>
-              <a:rPr lang="en-US" dirty="0" smtClean="0"/>
-              <a:t>Only</a:t>
-            </a:r>
-            <a:r>
-              <a:rPr lang="de-DE" dirty="0" smtClean="0"/>
-              <a:t> </a:t>
-            </a:r>
-            <a:r>
-              <a:rPr lang="en-US" dirty="0" smtClean="0"/>
-              <a:t>one</a:t>
-            </a:r>
-            <a:r>
-              <a:rPr lang="de-DE" dirty="0" smtClean="0"/>
-              <a:t> URL</a:t>
-            </a:r>
-            <a:endParaRPr lang="en-US" dirty="0"/>
-          </a:p>
-          <a:p>
-            <a:endParaRPr lang="en-US" i="1" dirty="0" smtClean="0">
-              <a:solidFill>
-                <a:schemeClr val="tx2"/>
-              </a:solidFill>
-            </a:endParaRPr>
-          </a:p>
-        </p:txBody>
-      </p:sp>
-      <p:sp>
-        <p:nvSpPr>
-          <p:cNvPr id="2" name="Titel 1"/>
-          <p:cNvSpPr>
-            <a:spLocks noGrp="1"/>
-          </p:cNvSpPr>
-          <p:nvPr>
-            <p:ph type="title"/>
-          </p:nvPr>
-        </p:nvSpPr>
-        <p:spPr/>
-        <p:txBody>
-          <a:bodyPr>
-            <a:normAutofit/>
-          </a:bodyPr>
-          <a:lstStyle/>
-          <a:p>
-            <a:r>
-              <a:rPr lang="en-US" dirty="0" smtClean="0"/>
-              <a:t>Application state</a:t>
-            </a:r>
-            <a:endParaRPr lang="en-US" dirty="0"/>
-          </a:p>
-        </p:txBody>
-      </p:sp>
-      <p:sp>
-        <p:nvSpPr>
-          <p:cNvPr id="7" name="Abgerundetes Rechteck 6"/>
-          <p:cNvSpPr/>
-          <p:nvPr/>
-        </p:nvSpPr>
-        <p:spPr>
-          <a:xfrm>
-            <a:off x="4932040" y="4284580"/>
-            <a:ext cx="1867282" cy="996868"/>
-          </a:xfrm>
-          <a:prstGeom prst="roundRect">
-            <a:avLst/>
-          </a:prstGeom>
-        </p:spPr>
-        <p:style>
-          <a:lnRef idx="1">
-            <a:schemeClr val="accent3"/>
-          </a:lnRef>
-          <a:fillRef idx="3">
-            <a:schemeClr val="accent3"/>
-          </a:fillRef>
-          <a:effectRef idx="2">
-            <a:schemeClr val="accent3"/>
-          </a:effectRef>
-          <a:fontRef idx="minor">
-            <a:schemeClr val="lt1"/>
-          </a:fontRef>
-        </p:style>
-        <p:txBody>
-          <a:bodyPr rtlCol="0" anchor="ctr"/>
-          <a:lstStyle/>
-          <a:p>
-            <a:pPr algn="ctr"/>
-            <a:r>
-              <a:rPr lang="de-DE" dirty="0" smtClean="0"/>
-              <a:t>Session ID</a:t>
-            </a:r>
-            <a:endParaRPr lang="en-US" dirty="0"/>
-          </a:p>
-        </p:txBody>
-      </p:sp>
-      <p:sp>
-        <p:nvSpPr>
-          <p:cNvPr id="8" name="Textfeld 7"/>
-          <p:cNvSpPr txBox="1"/>
-          <p:nvPr/>
-        </p:nvSpPr>
-        <p:spPr>
-          <a:xfrm>
-            <a:off x="4999122" y="4249595"/>
-            <a:ext cx="712054" cy="307777"/>
-          </a:xfrm>
-          <a:prstGeom prst="rect">
-            <a:avLst/>
-          </a:prstGeom>
-          <a:noFill/>
-        </p:spPr>
-        <p:txBody>
-          <a:bodyPr wrap="none" rtlCol="0">
-            <a:spAutoFit/>
-          </a:bodyPr>
-          <a:lstStyle/>
-          <a:p>
-            <a:r>
-              <a:rPr lang="de-DE" sz="1400" dirty="0" smtClean="0"/>
-              <a:t>Server</a:t>
-            </a:r>
-            <a:endParaRPr lang="en-US" sz="1400" dirty="0"/>
-          </a:p>
-        </p:txBody>
-      </p:sp>
-      <p:sp>
-        <p:nvSpPr>
-          <p:cNvPr id="9" name="Abgerundetes Rechteck 8"/>
-          <p:cNvSpPr/>
-          <p:nvPr/>
-        </p:nvSpPr>
-        <p:spPr>
-          <a:xfrm>
-            <a:off x="1763687" y="3933056"/>
-            <a:ext cx="2882783" cy="1672345"/>
-          </a:xfrm>
-          <a:prstGeom prst="roundRect">
-            <a:avLst/>
-          </a:prstGeom>
-        </p:spPr>
-        <p:style>
-          <a:lnRef idx="1">
-            <a:schemeClr val="accent3"/>
-          </a:lnRef>
-          <a:fillRef idx="3">
-            <a:schemeClr val="accent3"/>
-          </a:fillRef>
-          <a:effectRef idx="2">
-            <a:schemeClr val="accent3"/>
-          </a:effectRef>
-          <a:fontRef idx="minor">
-            <a:schemeClr val="lt1"/>
-          </a:fontRef>
-        </p:style>
-        <p:txBody>
-          <a:bodyPr rtlCol="0" anchor="ctr"/>
-          <a:lstStyle/>
-          <a:p>
-            <a:pPr marL="285750" indent="-285750">
-              <a:buFont typeface="Wingdings" pitchFamily="2" charset="2"/>
-              <a:buChar char="§"/>
-            </a:pPr>
-            <a:r>
-              <a:rPr lang="de-DE" dirty="0" smtClean="0"/>
-              <a:t>Transaction State</a:t>
-            </a:r>
-          </a:p>
-          <a:p>
-            <a:pPr marL="285750" indent="-285750">
-              <a:buFont typeface="Wingdings" pitchFamily="2" charset="2"/>
-              <a:buChar char="§"/>
-            </a:pPr>
-            <a:r>
-              <a:rPr lang="de-DE" dirty="0" smtClean="0"/>
-              <a:t>Form State</a:t>
-            </a:r>
-          </a:p>
-          <a:p>
-            <a:pPr marL="285750" indent="-285750">
-              <a:buFont typeface="Wingdings" pitchFamily="2" charset="2"/>
-              <a:buChar char="§"/>
-            </a:pPr>
-            <a:r>
-              <a:rPr lang="de-DE" dirty="0" smtClean="0"/>
-              <a:t>Authentication State</a:t>
-            </a:r>
-            <a:endParaRPr lang="en-US" dirty="0"/>
-          </a:p>
-        </p:txBody>
-      </p:sp>
-      <p:sp>
-        <p:nvSpPr>
-          <p:cNvPr id="10" name="Textfeld 9"/>
-          <p:cNvSpPr txBox="1"/>
-          <p:nvPr/>
-        </p:nvSpPr>
-        <p:spPr>
-          <a:xfrm>
-            <a:off x="1979712" y="3908356"/>
-            <a:ext cx="643125" cy="307777"/>
-          </a:xfrm>
-          <a:prstGeom prst="rect">
-            <a:avLst/>
-          </a:prstGeom>
-          <a:noFill/>
-        </p:spPr>
-        <p:txBody>
-          <a:bodyPr wrap="none" rtlCol="0">
-            <a:spAutoFit/>
-          </a:bodyPr>
-          <a:lstStyle/>
-          <a:p>
-            <a:r>
-              <a:rPr lang="de-DE" sz="1400" dirty="0" smtClean="0"/>
-              <a:t>Client</a:t>
-            </a:r>
-            <a:endParaRPr lang="en-US" sz="1400" dirty="0"/>
-          </a:p>
-        </p:txBody>
-      </p:sp>
-    </p:spTree>
-    <p:extLst>
-      <p:ext uri="{BB962C8B-B14F-4D97-AF65-F5344CB8AC3E}">
-        <p14:creationId xmlns:p14="http://schemas.microsoft.com/office/powerpoint/2010/main" val="2921445458"/>
-      </p:ext>
-    </p:extLst>
-  </p:cSld>
-  <p:clrMapOvr>
-    <a:masterClrMapping/>
-  </p:clrMapOvr>
   <p:timing>
     <p:tnLst>
       <p:par>
@@ -6264,7 +7239,7 @@
           <a:p>
             <a:r>
               <a:rPr lang="de-DE" dirty="0" smtClean="0"/>
-              <a:t>Security/Encryption</a:t>
+              <a:t>Data Overhead/Performance</a:t>
             </a:r>
             <a:endParaRPr lang="en-US" dirty="0"/>
           </a:p>
@@ -6282,184 +7257,88 @@
         </p:nvSpPr>
         <p:spPr/>
         <p:txBody>
-          <a:bodyPr>
-            <a:normAutofit fontScale="92500" lnSpcReduction="20000"/>
-          </a:bodyPr>
-          <a:lstStyle/>
-          <a:p>
-            <a:r>
-              <a:rPr lang="de-DE" dirty="0" smtClean="0"/>
-              <a:t>DOS Attacken</a:t>
+          <a:bodyPr/>
+          <a:lstStyle/>
+          <a:p>
+            <a:r>
+              <a:rPr lang="en-US" dirty="0" smtClean="0"/>
+              <a:t>JSON better than Atom</a:t>
+            </a:r>
+          </a:p>
+          <a:p>
+            <a:r>
+              <a:rPr lang="en-US" dirty="0" smtClean="0"/>
+              <a:t>JSON format</a:t>
             </a:r>
           </a:p>
           <a:p>
             <a:pPr lvl="1"/>
             <a:r>
-              <a:rPr lang="en-US" i="1" dirty="0" err="1">
-                <a:solidFill>
-                  <a:schemeClr val="tx2"/>
-                </a:solidFill>
-              </a:rPr>
-              <a:t>ODataERP.svc</a:t>
-            </a:r>
-            <a:r>
-              <a:rPr lang="en-US" i="1" dirty="0">
-                <a:solidFill>
-                  <a:schemeClr val="tx2"/>
-                </a:solidFill>
-              </a:rPr>
-              <a:t>/Customer</a:t>
-            </a:r>
-            <a:r>
-              <a:rPr lang="en-US" i="1" dirty="0" smtClean="0">
-                <a:solidFill>
-                  <a:schemeClr val="tx2"/>
-                </a:solidFill>
-              </a:rPr>
-              <a:t>?$top=100000000$expand=Orders</a:t>
+              <a:rPr lang="en-US" dirty="0" smtClean="0"/>
+              <a:t>URL for foreign keys</a:t>
             </a:r>
           </a:p>
           <a:p>
             <a:pPr lvl="1"/>
             <a:r>
               <a:rPr lang="en-US" dirty="0" smtClean="0"/>
-              <a:t>Limit range of possible selections</a:t>
-            </a:r>
-          </a:p>
-          <a:p>
-            <a:pPr lvl="1"/>
-            <a:r>
-              <a:rPr lang="de-DE" dirty="0" smtClean="0"/>
-              <a:t>Limit </a:t>
-            </a:r>
-            <a:r>
-              <a:rPr lang="en-US" dirty="0" smtClean="0"/>
-              <a:t>execution</a:t>
-            </a:r>
-            <a:r>
-              <a:rPr lang="de-DE" dirty="0" smtClean="0"/>
-              <a:t> time on </a:t>
-            </a:r>
-            <a:r>
-              <a:rPr lang="de-DE" dirty="0" err="1" smtClean="0"/>
-              <a:t>data</a:t>
-            </a:r>
-            <a:r>
-              <a:rPr lang="de-DE" dirty="0" smtClean="0"/>
-              <a:t> </a:t>
-            </a:r>
-            <a:r>
-              <a:rPr lang="de-DE" dirty="0" err="1" smtClean="0"/>
-              <a:t>base</a:t>
-            </a:r>
-            <a:r>
-              <a:rPr lang="de-DE" dirty="0" smtClean="0"/>
-              <a:t> </a:t>
-            </a:r>
-            <a:r>
-              <a:rPr lang="de-DE" dirty="0" err="1" smtClean="0"/>
-              <a:t>layer</a:t>
-            </a:r>
-            <a:endParaRPr lang="de-DE" dirty="0" smtClean="0"/>
-          </a:p>
-          <a:p>
-            <a:pPr lvl="1"/>
-            <a:endParaRPr lang="en-US" dirty="0" smtClean="0"/>
-          </a:p>
-          <a:p>
-            <a:r>
-              <a:rPr lang="en-US" dirty="0" smtClean="0"/>
-              <a:t>No encryption in </a:t>
-            </a:r>
-            <a:r>
-              <a:rPr lang="en-US" dirty="0" err="1" smtClean="0"/>
-              <a:t>OData</a:t>
-            </a:r>
-            <a:r>
-              <a:rPr lang="en-US" dirty="0" smtClean="0"/>
-              <a:t>:</a:t>
-            </a:r>
-          </a:p>
-          <a:p>
-            <a:pPr lvl="1"/>
-            <a:r>
-              <a:rPr lang="en-US" dirty="0" smtClean="0"/>
-              <a:t>Use</a:t>
-            </a:r>
-            <a:r>
-              <a:rPr lang="de-DE" dirty="0" smtClean="0"/>
-              <a:t> HTTPS</a:t>
-            </a:r>
-          </a:p>
-          <a:p>
-            <a:pPr lvl="1"/>
-            <a:endParaRPr lang="en-US" dirty="0" smtClean="0"/>
-          </a:p>
-          <a:p>
-            <a:r>
-              <a:rPr lang="en-US" dirty="0" smtClean="0"/>
-              <a:t>Authorization on entity level:</a:t>
-            </a:r>
-          </a:p>
-          <a:p>
-            <a:pPr lvl="1"/>
-            <a:r>
-              <a:rPr lang="en-US" sz="1400" dirty="0" err="1" smtClean="0"/>
-              <a:t>config.SetEntitySetAccessRule</a:t>
-            </a:r>
-            <a:r>
-              <a:rPr lang="en-US" sz="1400" dirty="0" smtClean="0"/>
-              <a:t>("*", </a:t>
-            </a:r>
-            <a:r>
-              <a:rPr lang="en-US" sz="1400" dirty="0" err="1" smtClean="0"/>
-              <a:t>EntitySetRights.All</a:t>
-            </a:r>
-            <a:r>
-              <a:rPr lang="en-US" sz="1400" dirty="0" smtClean="0"/>
-              <a:t>);</a:t>
-            </a:r>
-          </a:p>
-          <a:p>
-            <a:pPr lvl="1"/>
-            <a:endParaRPr lang="de-DE" sz="1400" dirty="0" smtClean="0"/>
-          </a:p>
-          <a:p>
-            <a:r>
-              <a:rPr lang="en-US" dirty="0" smtClean="0"/>
-              <a:t>No </a:t>
-            </a:r>
-            <a:r>
-              <a:rPr lang="en-US" dirty="0"/>
-              <a:t>authentication in </a:t>
-            </a:r>
-            <a:r>
-              <a:rPr lang="en-US" dirty="0" err="1"/>
-              <a:t>OData</a:t>
-            </a:r>
+              <a:t>Property names for each entry</a:t>
+            </a:r>
+          </a:p>
+          <a:p>
             <a:endParaRPr lang="en-US" dirty="0"/>
           </a:p>
-          <a:p>
-            <a:pPr lvl="1"/>
-            <a:r>
-              <a:rPr lang="en-US" dirty="0"/>
-              <a:t>Authentication on a different layer (e.g. using </a:t>
-            </a:r>
-            <a:r>
-              <a:rPr lang="en-US" dirty="0" err="1"/>
-              <a:t>OAuth</a:t>
-            </a:r>
-            <a:r>
-              <a:rPr lang="en-US" dirty="0" smtClean="0"/>
-              <a:t>)</a:t>
-            </a:r>
+        </p:txBody>
+      </p:sp>
+      <p:graphicFrame>
+        <p:nvGraphicFramePr>
+          <p:cNvPr id="4" name="Chart 3"/>
+          <p:cNvGraphicFramePr/>
+          <p:nvPr>
+            <p:extLst>
+              <p:ext uri="{D42A27DB-BD31-4B8C-83A1-F6EECF244321}">
+                <p14:modId xmlns:p14="http://schemas.microsoft.com/office/powerpoint/2010/main" val="1558586127"/>
+              </p:ext>
+            </p:extLst>
+          </p:nvPr>
+        </p:nvGraphicFramePr>
+        <p:xfrm>
+          <a:off x="4499992" y="2708920"/>
+          <a:ext cx="4644008" cy="3933056"/>
+        </p:xfrm>
+        <a:graphic>
+          <a:graphicData uri="http://schemas.openxmlformats.org/drawingml/2006/chart">
+            <c:chart xmlns:c="http://schemas.openxmlformats.org/drawingml/2006/chart" xmlns:r="http://schemas.openxmlformats.org/officeDocument/2006/relationships" r:id="rId3"/>
+          </a:graphicData>
+        </a:graphic>
+      </p:graphicFrame>
+      <p:sp>
+        <p:nvSpPr>
+          <p:cNvPr id="5" name="Slide Number Placeholder 4"/>
+          <p:cNvSpPr>
+            <a:spLocks noGrp="1"/>
+          </p:cNvSpPr>
+          <p:nvPr>
+            <p:ph type="sldNum" sz="quarter" idx="12"/>
+          </p:nvPr>
+        </p:nvSpPr>
+        <p:spPr/>
+        <p:txBody>
+          <a:bodyPr/>
+          <a:lstStyle/>
+          <a:p>
+            <a:fld id="{466192DD-7082-457C-A0B1-061B97E09436}" type="slidenum">
+              <a:rPr lang="en-US" smtClean="0"/>
+              <a:t>7</a:t>
+            </a:fld>
+            <a:endParaRPr lang="en-US"/>
           </a:p>
         </p:txBody>
       </p:sp>
     </p:spTree>
     <p:extLst>
       <p:ext uri="{BB962C8B-B14F-4D97-AF65-F5344CB8AC3E}">
-        <p14:creationId xmlns:p14="http://schemas.microsoft.com/office/powerpoint/2010/main" val="3662046302"/>
+        <p14:creationId xmlns:p14="http://schemas.microsoft.com/office/powerpoint/2010/main" val="2318432606"/>
       </p:ext>
     </p:extLst>
   </p:cSld>
@@ -6495,6 +7374,61 @@
       </p:grpSpPr>
       <p:sp>
         <p:nvSpPr>
+          <p:cNvPr id="11" name="Inhaltsplatzhalter 2"/>
+          <p:cNvSpPr>
+            <a:spLocks noGrp="1"/>
+          </p:cNvSpPr>
+          <p:nvPr>
+            <p:ph idx="1"/>
+          </p:nvPr>
+        </p:nvSpPr>
+        <p:spPr>
+          <a:xfrm>
+            <a:off x="914400" y="2769833"/>
+            <a:ext cx="7315200" cy="3539527"/>
+          </a:xfrm>
+        </p:spPr>
+        <p:txBody>
+          <a:bodyPr>
+            <a:normAutofit/>
+          </a:bodyPr>
+          <a:lstStyle/>
+          <a:p>
+            <a:r>
+              <a:rPr lang="en-US" dirty="0" smtClean="0"/>
+              <a:t>Complete asynchronous communication</a:t>
+            </a:r>
+          </a:p>
+          <a:p>
+            <a:r>
+              <a:rPr lang="en-US" dirty="0" smtClean="0"/>
+              <a:t>Only</a:t>
+            </a:r>
+            <a:r>
+              <a:rPr lang="de-DE" dirty="0" smtClean="0"/>
+              <a:t> </a:t>
+            </a:r>
+            <a:r>
+              <a:rPr lang="en-US" dirty="0" smtClean="0"/>
+              <a:t>one</a:t>
+            </a:r>
+            <a:r>
+              <a:rPr lang="de-DE" dirty="0" smtClean="0"/>
+              <a:t> URL</a:t>
+            </a:r>
+            <a:endParaRPr lang="en-US" dirty="0"/>
+          </a:p>
+          <a:p>
+            <a:endParaRPr lang="en-US" i="1" dirty="0" smtClean="0">
+              <a:solidFill>
+                <a:schemeClr val="tx2"/>
+              </a:solidFill>
+            </a:endParaRPr>
+          </a:p>
+        </p:txBody>
+      </p:sp>
+      <p:sp>
+        <p:nvSpPr>
           <p:cNvPr id="2" name="Titel 1"/>
           <p:cNvSpPr>
             <a:spLocks noGrp="1"/>
@@ -6505,12 +7439,56 @@
         </p:nvSpPr>
         <p:spPr/>
         <p:txBody>
-          <a:bodyPr/>
-          <a:lstStyle/>
-          <a:p>
+          <a:bodyPr>
+            <a:normAutofit/>
+          </a:bodyPr>
+          <a:lstStyle/>
+          <a:p>
+            <a:r>
+              <a:rPr lang="en-US" dirty="0" smtClean="0"/>
+              <a:t>Application state</a:t>
+            </a:r>
+            <a:endParaRPr lang="en-US" dirty="0"/>
+          </a:p>
+        </p:txBody>
+      </p:sp>
+      <p:sp>
+        <p:nvSpPr>
+          <p:cNvPr id="7" name="Abgerundetes Rechteck 6"/>
+          <p:cNvSpPr/>
+          <p:nvPr/>
+        </p:nvSpPr>
+        <p:spPr>
+          <a:xfrm>
+            <a:off x="4932040" y="4284580"/>
+            <a:ext cx="1867282" cy="996868"/>
+          </a:xfrm>
+          <a:prstGeom prst="roundRect">
+            <a:avLst/>
+          </a:prstGeom>
+        </p:spPr>
+        <p:style>
+          <a:lnRef idx="1">
+            <a:schemeClr val="accent3"/>
+          </a:lnRef>
+          <a:fillRef idx="3">
+            <a:schemeClr val="accent3"/>
+          </a:fillRef>
+          <a:effectRef idx="2">
+            <a:schemeClr val="accent3"/>
+          </a:effectRef>
+          <a:fontRef idx="minor">
+            <a:schemeClr val="lt1"/>
+          </a:fontRef>
+        </p:style>
+        <p:txBody>
+          <a:bodyPr rtlCol="0" anchor="ctr"/>
+          <a:lstStyle/>
+          <a:p>
+            <a:pPr algn="ctr"/>
             <a:r>
               <a:rPr lang="de-DE" dirty="0" smtClean="0"/>
-              <a:t>HPAs</a:t>
+              <a:t>Session ID</a:t>
             </a:r>
             <a:endParaRPr lang="en-US" dirty="0"/>
           </a:p>
@@ -6518,94 +7496,156 @@
       </p:sp>
       <p:sp>
         <p:nvSpPr>
-          <p:cNvPr id="3" name="Inhaltsplatzhalter 2"/>
-          <p:cNvSpPr>
-            <a:spLocks noGrp="1"/>
-          </p:cNvSpPr>
-          <p:nvPr>
-            <p:ph idx="1"/>
-          </p:nvPr>
-        </p:nvSpPr>
-        <p:spPr/>
-        <p:txBody>
-          <a:bodyPr/>
-          <a:lstStyle/>
-          <a:p>
-            <a:r>
-              <a:rPr lang="en-US" dirty="0" err="1" smtClean="0"/>
-              <a:t>OData</a:t>
-            </a:r>
-            <a:r>
-              <a:rPr lang="en-US" dirty="0" smtClean="0"/>
-              <a:t> in context of High Performance Applications</a:t>
-            </a:r>
-          </a:p>
-          <a:p>
+          <p:cNvPr id="8" name="Textfeld 7"/>
+          <p:cNvSpPr txBox="1"/>
+          <p:nvPr/>
+        </p:nvSpPr>
+        <p:spPr>
+          <a:xfrm>
+            <a:off x="4999122" y="4249595"/>
+            <a:ext cx="712054" cy="307777"/>
+          </a:xfrm>
+          <a:prstGeom prst="rect">
+            <a:avLst/>
+          </a:prstGeom>
+          <a:noFill/>
+        </p:spPr>
+        <p:txBody>
+          <a:bodyPr wrap="none" rtlCol="0">
+            <a:spAutoFit/>
+          </a:bodyPr>
+          <a:lstStyle/>
+          <a:p>
+            <a:r>
+              <a:rPr lang="de-DE" sz="1400" dirty="0" smtClean="0"/>
+              <a:t>Server</a:t>
+            </a:r>
+            <a:endParaRPr lang="en-US" sz="1400" dirty="0"/>
+          </a:p>
+        </p:txBody>
+      </p:sp>
+      <p:sp>
+        <p:nvSpPr>
+          <p:cNvPr id="9" name="Abgerundetes Rechteck 8"/>
+          <p:cNvSpPr/>
+          <p:nvPr/>
+        </p:nvSpPr>
+        <p:spPr>
+          <a:xfrm>
+            <a:off x="1763687" y="3933056"/>
+            <a:ext cx="2882783" cy="1672345"/>
+          </a:xfrm>
+          <a:prstGeom prst="roundRect">
+            <a:avLst/>
+          </a:prstGeom>
+        </p:spPr>
+        <p:style>
+          <a:lnRef idx="1">
+            <a:schemeClr val="accent3"/>
+          </a:lnRef>
+          <a:fillRef idx="3">
+            <a:schemeClr val="accent3"/>
+          </a:fillRef>
+          <a:effectRef idx="2">
+            <a:schemeClr val="accent3"/>
+          </a:effectRef>
+          <a:fontRef idx="minor">
+            <a:schemeClr val="lt1"/>
+          </a:fontRef>
+        </p:style>
+        <p:txBody>
+          <a:bodyPr rtlCol="0" anchor="ctr"/>
+          <a:lstStyle/>
+          <a:p>
+            <a:pPr marL="285750" indent="-285750">
+              <a:buFont typeface="Wingdings" pitchFamily="2" charset="2"/>
+              <a:buChar char="§"/>
+            </a:pPr>
             <a:r>
               <a:rPr lang="de-DE" dirty="0" smtClean="0"/>
-              <a:t>Modern HTML5 </a:t>
-            </a:r>
-            <a:r>
-              <a:rPr lang="en-US" dirty="0" smtClean="0"/>
-              <a:t>web applications</a:t>
-            </a:r>
-          </a:p>
-          <a:p>
-            <a:r>
-              <a:rPr lang="en-US" dirty="0" smtClean="0"/>
-              <a:t>Most of the code is JavaScript (90%)</a:t>
-            </a:r>
-          </a:p>
-          <a:p>
-            <a:r>
-              <a:rPr lang="en-US" dirty="0" smtClean="0"/>
-              <a:t>Using </a:t>
-            </a:r>
-            <a:r>
-              <a:rPr lang="en-US" dirty="0" err="1" smtClean="0"/>
-              <a:t>OData</a:t>
-            </a:r>
-            <a:r>
-              <a:rPr lang="en-US" dirty="0" smtClean="0"/>
-              <a:t> for communication</a:t>
-            </a:r>
-          </a:p>
-          <a:p>
-            <a:pPr lvl="1"/>
-            <a:r>
-              <a:rPr lang="en-US" dirty="0" smtClean="0"/>
-              <a:t>HANA </a:t>
-            </a:r>
-            <a:r>
-              <a:rPr lang="en-US" dirty="0" err="1" smtClean="0"/>
-              <a:t>OData</a:t>
-            </a:r>
-            <a:r>
-              <a:rPr lang="en-US" dirty="0" smtClean="0"/>
-              <a:t> Server available</a:t>
-            </a:r>
-          </a:p>
-          <a:p>
-            <a:pPr lvl="1"/>
-            <a:r>
-              <a:rPr lang="en-US" dirty="0" smtClean="0"/>
-              <a:t>Great for read access</a:t>
-            </a:r>
-          </a:p>
-          <a:p>
-            <a:pPr lvl="1"/>
-            <a:r>
-              <a:rPr lang="en-US" dirty="0" smtClean="0"/>
-              <a:t>Bad for writing access</a:t>
+              <a:t>Transaction State</a:t>
+            </a:r>
+          </a:p>
+          <a:p>
+            <a:pPr marL="285750" indent="-285750">
+              <a:buFont typeface="Wingdings" pitchFamily="2" charset="2"/>
+              <a:buChar char="§"/>
+            </a:pPr>
+            <a:r>
+              <a:rPr lang="de-DE" dirty="0" smtClean="0"/>
+              <a:t>Form State</a:t>
+            </a:r>
+          </a:p>
+          <a:p>
+            <a:pPr marL="285750" indent="-285750">
+              <a:buFont typeface="Wingdings" pitchFamily="2" charset="2"/>
+              <a:buChar char="§"/>
+            </a:pPr>
+            <a:r>
+              <a:rPr lang="de-DE" dirty="0" smtClean="0"/>
+              <a:t>Authentication State</a:t>
             </a:r>
             <a:endParaRPr lang="en-US" dirty="0"/>
+          </a:p>
+        </p:txBody>
+      </p:sp>
+      <p:sp>
+        <p:nvSpPr>
+          <p:cNvPr id="10" name="Textfeld 9"/>
+          <p:cNvSpPr txBox="1"/>
+          <p:nvPr/>
+        </p:nvSpPr>
+        <p:spPr>
+          <a:xfrm>
+            <a:off x="1979712" y="3908356"/>
+            <a:ext cx="643125" cy="307777"/>
+          </a:xfrm>
+          <a:prstGeom prst="rect">
+            <a:avLst/>
+          </a:prstGeom>
+          <a:noFill/>
+        </p:spPr>
+        <p:txBody>
+          <a:bodyPr wrap="none" rtlCol="0">
+            <a:spAutoFit/>
+          </a:bodyPr>
+          <a:lstStyle/>
+          <a:p>
+            <a:r>
+              <a:rPr lang="de-DE" sz="1400" dirty="0" smtClean="0"/>
+              <a:t>Client</a:t>
+            </a:r>
+            <a:endParaRPr lang="en-US" sz="1400" dirty="0"/>
+          </a:p>
+        </p:txBody>
+      </p:sp>
+      <p:sp>
+        <p:nvSpPr>
+          <p:cNvPr id="3" name="Slide Number Placeholder 2"/>
+          <p:cNvSpPr>
+            <a:spLocks noGrp="1"/>
+          </p:cNvSpPr>
+          <p:nvPr>
+            <p:ph type="sldNum" sz="quarter" idx="12"/>
+          </p:nvPr>
+        </p:nvSpPr>
+        <p:spPr/>
+        <p:txBody>
+          <a:bodyPr/>
+          <a:lstStyle/>
+          <a:p>
+            <a:fld id="{466192DD-7082-457C-A0B1-061B97E09436}" type="slidenum">
+              <a:rPr lang="en-US" smtClean="0"/>
+              <a:t>8</a:t>
+            </a:fld>
+            <a:endParaRPr lang="en-US"/>
           </a:p>
         </p:txBody>
       </p:sp>
     </p:spTree>
     <p:extLst>
       <p:ext uri="{BB962C8B-B14F-4D97-AF65-F5344CB8AC3E}">
-        <p14:creationId xmlns:p14="http://schemas.microsoft.com/office/powerpoint/2010/main" val="1951603237"/>
+        <p14:creationId xmlns:p14="http://schemas.microsoft.com/office/powerpoint/2010/main" val="2921445458"/>
       </p:ext>
     </p:extLst>
   </p:cSld>
@@ -6655,50 +7695,113 @@
           <a:lstStyle/>
           <a:p>
             <a:r>
+              <a:rPr lang="de-DE" dirty="0" smtClean="0"/>
+              <a:t>Security/Encryption</a:t>
+            </a:r>
+            <a:endParaRPr lang="en-US" dirty="0"/>
+          </a:p>
+        </p:txBody>
+      </p:sp>
+      <p:sp>
+        <p:nvSpPr>
+          <p:cNvPr id="3" name="Inhaltsplatzhalter 2"/>
+          <p:cNvSpPr>
+            <a:spLocks noGrp="1"/>
+          </p:cNvSpPr>
+          <p:nvPr>
+            <p:ph idx="1"/>
+          </p:nvPr>
+        </p:nvSpPr>
+        <p:spPr/>
+        <p:txBody>
+          <a:bodyPr>
+            <a:normAutofit fontScale="92500" lnSpcReduction="20000"/>
+          </a:bodyPr>
+          <a:lstStyle/>
+          <a:p>
+            <a:r>
+              <a:rPr lang="de-DE" dirty="0" smtClean="0"/>
+              <a:t>DOS Attacken</a:t>
+            </a:r>
+          </a:p>
+          <a:p>
+            <a:pPr lvl="1"/>
+            <a:r>
+              <a:rPr lang="en-US" i="1" dirty="0" err="1">
+                <a:solidFill>
+                  <a:schemeClr val="tx2"/>
+                </a:solidFill>
+              </a:rPr>
+              <a:t>ODataERP.svc</a:t>
+            </a:r>
+            <a:r>
+              <a:rPr lang="en-US" i="1" dirty="0">
+                <a:solidFill>
+                  <a:schemeClr val="tx2"/>
+                </a:solidFill>
+              </a:rPr>
+              <a:t>/Customer</a:t>
+            </a:r>
+            <a:r>
+              <a:rPr lang="en-US" i="1" dirty="0" smtClean="0">
+                <a:solidFill>
+                  <a:schemeClr val="tx2"/>
+                </a:solidFill>
+              </a:rPr>
+              <a:t>?$top=100000000$expand=Orders</a:t>
+            </a:r>
+          </a:p>
+          <a:p>
+            <a:pPr lvl="1"/>
+            <a:r>
               <a:rPr lang="en-US" dirty="0" smtClean="0"/>
-              <a:t>Ideas</a:t>
-            </a:r>
-            <a:endParaRPr lang="en-US" dirty="0"/>
-          </a:p>
-        </p:txBody>
-      </p:sp>
-      <p:sp>
-        <p:nvSpPr>
-          <p:cNvPr id="3" name="Inhaltsplatzhalter 2"/>
-          <p:cNvSpPr>
-            <a:spLocks noGrp="1"/>
-          </p:cNvSpPr>
-          <p:nvPr>
-            <p:ph idx="1"/>
-          </p:nvPr>
-        </p:nvSpPr>
-        <p:spPr/>
-        <p:txBody>
-          <a:bodyPr/>
-          <a:lstStyle/>
-          <a:p>
+              <a:t>Limit range of possible selections</a:t>
+            </a:r>
+          </a:p>
+          <a:p>
+            <a:pPr lvl="1"/>
             <a:r>
               <a:rPr lang="de-DE" dirty="0" smtClean="0"/>
-              <a:t>360/1100 = 32% LOC </a:t>
+              <a:t>Limit </a:t>
+            </a:r>
+            <a:r>
+              <a:rPr lang="en-US" dirty="0" smtClean="0"/>
+              <a:t>execution</a:t>
+            </a:r>
+            <a:r>
+              <a:rPr lang="de-DE" dirty="0" smtClean="0"/>
+              <a:t> time on </a:t>
             </a:r>
             <a:r>
               <a:rPr lang="de-DE" dirty="0" err="1" smtClean="0"/>
-              <a:t>OData</a:t>
+              <a:t>data</a:t>
             </a:r>
             <a:r>
               <a:rPr lang="de-DE" dirty="0" smtClean="0"/>
-              <a:t> Service </a:t>
+              <a:t> </a:t>
             </a:r>
             <a:r>
               <a:rPr lang="de-DE" dirty="0" err="1" smtClean="0"/>
-              <a:t>Functions</a:t>
+              <a:t>base</a:t>
+            </a:r>
+            <a:r>
+              <a:rPr lang="de-DE" dirty="0" smtClean="0"/>
+              <a:t> </a:t>
+            </a:r>
+            <a:r>
+              <a:rPr lang="de-DE" dirty="0" err="1" smtClean="0"/>
+              <a:t>layer</a:t>
             </a:r>
             <a:endParaRPr lang="de-DE" dirty="0" smtClean="0"/>
           </a:p>
           <a:p>
+            <a:pPr lvl="1"/>
+            <a:endParaRPr lang="en-US" dirty="0" smtClean="0"/>
+          </a:p>
+          <a:p>
             <a:r>
               <a:rPr lang="en-US" dirty="0" smtClean="0"/>
-              <a:t>Idea: </a:t>
+              <a:t>No encryption in </a:t>
             </a:r>
             <a:r>
               <a:rPr lang="en-US" dirty="0" err="1" smtClean="0"/>
@@ -6706,51 +7809,112 @@
             </a:r>
             <a:r>
               <a:rPr lang="en-US" dirty="0" smtClean="0"/>
-              <a:t> ORM for JavaScript</a:t>
+              <a:t>:</a:t>
             </a:r>
           </a:p>
           <a:p>
             <a:pPr lvl="1"/>
             <a:r>
               <a:rPr lang="en-US" dirty="0" smtClean="0"/>
-              <a:t>Shorter syntax</a:t>
+              <a:t>Use</a:t>
+            </a:r>
+            <a:r>
+              <a:rPr lang="de-DE" dirty="0" smtClean="0"/>
+              <a:t> HTTPS</a:t>
             </a:r>
           </a:p>
           <a:p>
             <a:pPr lvl="1"/>
+            <a:endParaRPr lang="en-US" dirty="0" smtClean="0"/>
+          </a:p>
+          <a:p>
             <a:r>
               <a:rPr lang="en-US" dirty="0" smtClean="0"/>
-              <a:t>Easier to express object creation</a:t>
+              <a:t>Authorization on entity level:</a:t>
             </a:r>
           </a:p>
           <a:p>
             <a:pPr lvl="1"/>
             <a:r>
+              <a:rPr lang="en-US" sz="1400" dirty="0" err="1" smtClean="0"/>
+              <a:t>config.SetEntitySetAccessRule</a:t>
+            </a:r>
+            <a:r>
+              <a:rPr lang="en-US" sz="1400" dirty="0" smtClean="0"/>
+              <a:t>("*", </a:t>
+            </a:r>
+            <a:r>
+              <a:rPr lang="en-US" sz="1400" dirty="0" err="1" smtClean="0"/>
+              <a:t>EntitySetRights.All</a:t>
+            </a:r>
+            <a:r>
+              <a:rPr lang="en-US" sz="1400" dirty="0" smtClean="0"/>
+              <a:t>);</a:t>
+            </a:r>
+          </a:p>
+          <a:p>
+            <a:pPr lvl="1"/>
+            <a:endParaRPr lang="de-DE" sz="1400" dirty="0" smtClean="0"/>
+          </a:p>
+          <a:p>
+            <a:r>
               <a:rPr lang="en-US" dirty="0" smtClean="0"/>
-              <a:t>Explore Service automatically</a:t>
-            </a:r>
+              <a:t>No </a:t>
+            </a:r>
+            <a:r>
+              <a:rPr lang="en-US" dirty="0"/>
+              <a:t>authentication in </a:t>
+            </a:r>
+            <a:r>
+              <a:rPr lang="en-US" dirty="0" err="1"/>
+              <a:t>OData</a:t>
+            </a:r>
+            <a:endParaRPr lang="en-US" dirty="0"/>
           </a:p>
           <a:p>
             <a:pPr lvl="1"/>
             <a:r>
+              <a:rPr lang="en-US" dirty="0"/>
+              <a:t>Authentication on a different layer (e.g. using </a:t>
+            </a:r>
+            <a:r>
+              <a:rPr lang="en-US" dirty="0" err="1"/>
+              <a:t>OAuth</a:t>
+            </a:r>
+            <a:r>
               <a:rPr lang="en-US" dirty="0" smtClean="0"/>
-              <a:t>Auto completion</a:t>
-            </a:r>
-          </a:p>
-          <a:p>
-            <a:pPr lvl="1"/>
-            <a:r>
-              <a:rPr lang="en-US" dirty="0" smtClean="0"/>
-              <a:t>Easier to read</a:t>
-            </a:r>
-            <a:endParaRPr lang="en-US" dirty="0"/>
+              <a:t>)</a:t>
+            </a:r>
+          </a:p>
+        </p:txBody>
+      </p:sp>
+      <p:sp>
+        <p:nvSpPr>
+          <p:cNvPr id="4" name="Slide Number Placeholder 3"/>
+          <p:cNvSpPr>
+            <a:spLocks noGrp="1"/>
+          </p:cNvSpPr>
+          <p:nvPr>
+            <p:ph type="sldNum" sz="quarter" idx="12"/>
+          </p:nvPr>
+        </p:nvSpPr>
+        <p:spPr/>
+        <p:txBody>
+          <a:bodyPr/>
+          <a:lstStyle/>
+          <a:p>
+            <a:fld id="{466192DD-7082-457C-A0B1-061B97E09436}" type="slidenum">
+              <a:rPr lang="en-US" smtClean="0"/>
+              <a:t>9</a:t>
+            </a:fld>
+            <a:endParaRPr lang="en-US"/>
           </a:p>
         </p:txBody>
       </p:sp>
     </p:spTree>
     <p:extLst>
       <p:ext uri="{BB962C8B-B14F-4D97-AF65-F5344CB8AC3E}">
-        <p14:creationId xmlns:p14="http://schemas.microsoft.com/office/powerpoint/2010/main" val="396667459"/>
+        <p14:creationId xmlns:p14="http://schemas.microsoft.com/office/powerpoint/2010/main" val="3662046302"/>
       </p:ext>
     </p:extLst>
   </p:cSld>
@@ -7340,4 +8504,324 @@
   <a:objectDefaults/>
   <a:extraClrSchemeLst/>
 </a:theme>
+</file>
+
+<file path=ppt/theme/theme3.xml><?xml version="1.0" encoding="utf-8"?>
+<a:theme xmlns:a="http://schemas.openxmlformats.org/drawingml/2006/main" name="Office Theme">
+  <a:themeElements>
+    <a:clrScheme name="Office">
+      <a:dk1>
+        <a:sysClr val="windowText" lastClr="000000"/>
+      </a:dk1>
+      <a:lt1>
+        <a:sysClr val="window" lastClr="FFFFFF"/>
+      </a:lt1>
+      <a:dk2>
+        <a:srgbClr val="1F497D"/>
+      </a:dk2>
+      <a:lt2>
+        <a:srgbClr val="EEECE1"/>
+      </a:lt2>
+      <a:accent1>
+        <a:srgbClr val="4F81BD"/>
+      </a:accent1>
+      <a:accent2>
+        <a:srgbClr val="C0504D"/>
+      </a:accent2>
+      <a:accent3>
+        <a:srgbClr val="9BBB59"/>
+      </a:accent3>
+      <a:accent4>
+        <a:srgbClr val="8064A2"/>
+      </a:accent4>
+      <a:accent5>
+        <a:srgbClr val="4BACC6"/>
+      </a:accent5>
+      <a:accent6>
+        <a:srgbClr val="F79646"/>
+      </a:accent6>
+      <a:hlink>
+        <a:srgbClr val="0000FF"/>
+      </a:hlink>
+      <a:folHlink>
+        <a:srgbClr val="800080"/>
+      </a:folHlink>
+    </a:clrScheme>
+    <a:fontScheme name="Office">
+      <a:majorFont>
+        <a:latin typeface="Calibri"/>
+        <a:ea typeface=""/>
+        <a:cs typeface=""/>
+        <a:font script="Jpan" typeface="ＭＳ Ｐゴシック"/>
+        <a:font script="Hang" typeface="맑은 고딕"/>
+        <a:font script="Hans" typeface="宋体"/>
+        <a:font script="Hant" typeface="新細明體"/>
+        <a:font script="Arab" typeface="Times New Roman"/>
+        <a:font script="Hebr" typeface="Times New Roman"/>
+        <a:font script="Thai" typeface="Angsana New"/>
+        <a:font script="Ethi" typeface="Nyala"/>
+        <a:font script="Beng" typeface="Vrinda"/>
+        <a:font script="Gujr" typeface="Shruti"/>
+        <a:font script="Khmr" typeface="MoolBoran"/>
+        <a:font script="Knda" typeface="Tunga"/>
+        <a:font script="Guru" typeface="Raavi"/>
+        <a:font script="Cans" typeface="Euphemia"/>
+        <a:font script="Cher" typeface="Plantagenet Cherokee"/>
+        <a:font script="Yiii" typeface="Microsoft Yi Baiti"/>
+        <a:font script="Tibt" typeface="Microsoft Himalaya"/>
+        <a:font script="Thaa" typeface="MV Boli"/>
+        <a:font script="Deva" typeface="Mangal"/>
+        <a:font script="Telu" typeface="Gautami"/>
+        <a:font script="Taml" typeface="Latha"/>
+        <a:font script="Syrc" typeface="Estrangelo Edessa"/>
+        <a:font script="Orya" typeface="Kalinga"/>
+        <a:font script="Mlym" typeface="Kartika"/>
+        <a:font script="Laoo" typeface="DokChampa"/>
+        <a:font script="Sinh" typeface="Iskoola Pota"/>
+        <a:font script="Mong" typeface="Mongolian Baiti"/>
+        <a:font script="Viet" typeface="Times New Roman"/>
+        <a:font script="Uigh" typeface="Microsoft Uighur"/>
+        <a:font script="Geor" typeface="Sylfaen"/>
+      </a:majorFont>
+      <a:minorFont>
+        <a:latin typeface="Calibri"/>
+        <a:ea typeface=""/>
+        <a:cs typeface=""/>
+        <a:font script="Jpan" typeface="ＭＳ Ｐゴシック"/>
+        <a:font script="Hang" typeface="맑은 고딕"/>
+        <a:font script="Hans" typeface="宋体"/>
+        <a:font script="Hant" typeface="新細明體"/>
+        <a:font script="Arab" typeface="Arial"/>
+        <a:font script="Hebr" typeface="Arial"/>
+        <a:font script="Thai" typeface="Cordia New"/>
+        <a:font script="Ethi" typeface="Nyala"/>
+        <a:font script="Beng" typeface="Vrinda"/>
+        <a:font script="Gujr" typeface="Shruti"/>
+        <a:font script="Khmr" typeface="DaunPenh"/>
+        <a:font script="Knda" typeface="Tunga"/>
+        <a:font script="Guru" typeface="Raavi"/>
+        <a:font script="Cans" typeface="Euphemia"/>
+        <a:font script="Cher" typeface="Plantagenet Cherokee"/>
+        <a:font script="Yiii" typeface="Microsoft Yi Baiti"/>
+        <a:font script="Tibt" typeface="Microsoft Himalaya"/>
+        <a:font script="Thaa" typeface="MV Boli"/>
+        <a:font script="Deva" typeface="Mangal"/>
+        <a:font script="Telu" typeface="Gautami"/>
+        <a:font script="Taml" typeface="Latha"/>
+        <a:font script="Syrc" typeface="Estrangelo Edessa"/>
+        <a:font script="Orya" typeface="Kalinga"/>
+        <a:font script="Mlym" typeface="Kartika"/>
+        <a:font script="Laoo" typeface="DokChampa"/>
+        <a:font script="Sinh" typeface="Iskoola Pota"/>
+        <a:font script="Mong" typeface="Mongolian Baiti"/>
+        <a:font script="Viet" typeface="Arial"/>
+        <a:font script="Uigh" typeface="Microsoft Uighur"/>
+        <a:font script="Geor" typeface="Sylfaen"/>
+      </a:minorFont>
+    </a:fontScheme>
+    <a:fmtScheme name="Office">
+      <a:fillStyleLst>
+        <a:solidFill>
+          <a:schemeClr val="phClr"/>
+        </a:solidFill>
+        <a:gradFill rotWithShape="1">
+          <a:gsLst>
+            <a:gs pos="0">
+              <a:schemeClr val="phClr">
+                <a:tint val="50000"/>
+                <a:satMod val="300000"/>
+              </a:schemeClr>
+            </a:gs>
+            <a:gs pos="35000">
+              <a:schemeClr val="phClr">
+                <a:tint val="37000"/>
+                <a:satMod val="300000"/>
+              </a:schemeClr>
+            </a:gs>
+            <a:gs pos="100000">
+              <a:schemeClr val="phClr">
+                <a:tint val="15000"/>
+                <a:satMod val="350000"/>
+              </a:schemeClr>
+            </a:gs>
+          </a:gsLst>
+          <a:lin ang="16200000" scaled="1"/>
+        </a:gradFill>
+        <a:gradFill rotWithShape="1">
+          <a:gsLst>
+            <a:gs pos="0">
+              <a:schemeClr val="phClr">
+                <a:tint val="100000"/>
+                <a:shade val="100000"/>
+                <a:satMod val="130000"/>
+              </a:schemeClr>
+            </a:gs>
+            <a:gs pos="100000">
+              <a:schemeClr val="phClr">
+                <a:tint val="50000"/>
+                <a:shade val="100000"/>
+                <a:satMod val="350000"/>
+              </a:schemeClr>
+            </a:gs>
+          </a:gsLst>
+          <a:lin ang="16200000" scaled="0"/>
+        </a:gradFill>
+      </a:fillStyleLst>
+      <a:lnStyleLst>
+        <a:ln w="9525" cap="flat" cmpd="sng" algn="ctr">
+          <a:solidFill>
+            <a:schemeClr val="phClr">
+              <a:shade val="95000"/>
+              <a:satMod val="105000"/>
+            </a:schemeClr>
+          </a:solidFill>
+          <a:prstDash val="solid"/>
+        </a:ln>
+        <a:ln w="25400" cap="flat" cmpd="sng" algn="ctr">
+          <a:solidFill>
+            <a:schemeClr val="phClr"/>
+          </a:solidFill>
+          <a:prstDash val="solid"/>
+        </a:ln>
+        <a:ln w="38100" cap="flat" cmpd="sng" algn="ctr">
+          <a:solidFill>
+            <a:schemeClr val="phClr"/>
+          </a:solidFill>
+          <a:prstDash val="solid"/>
+        </a:ln>
+      </a:lnStyleLst>
+      <a:effectStyleLst>
+        <a:effectStyle>
+          <a:effectLst>
+            <a:outerShdw blurRad="40000" dist="20000" dir="5400000" rotWithShape="0">
+              <a:srgbClr val="000000">
+                <a:alpha val="38000"/>
+              </a:srgbClr>
+            </a:outerShdw>
+          </a:effectLst>
+        </a:effectStyle>
+        <a:effectStyle>
+          <a:effectLst>
+            <a:outerShdw blurRad="40000" dist="23000" dir="5400000" rotWithShape="0">
+              <a:srgbClr val="000000">
+                <a:alpha val="35000"/>
+              </a:srgbClr>
+            </a:outerShdw>
+          </a:effectLst>
+        </a:effectStyle>
+        <a:effectStyle>
+          <a:effectLst>
+            <a:outerShdw blurRad="40000" dist="23000" dir="5400000" rotWithShape="0">
+              <a:srgbClr val="000000">
+                <a:alpha val="35000"/>
+              </a:srgbClr>
+            </a:outerShdw>
+          </a:effectLst>
+          <a:scene3d>
+            <a:camera prst="orthographicFront">
+              <a:rot lat="0" lon="0" rev="0"/>
+            </a:camera>
+            <a:lightRig rig="threePt" dir="t">
+              <a:rot lat="0" lon="0" rev="1200000"/>
+            </a:lightRig>
+          </a:scene3d>
+          <a:sp3d>
+            <a:bevelT w="63500" h="25400"/>
+          </a:sp3d>
+        </a:effectStyle>
+      </a:effectStyleLst>
+      <a:bgFillStyleLst>
+        <a:solidFill>
+          <a:schemeClr val="phClr"/>
+        </a:solidFill>
+        <a:gradFill rotWithShape="1">
+          <a:gsLst>
+            <a:gs pos="0">
+              <a:schemeClr val="phClr">
+                <a:tint val="40000"/>
+                <a:satMod val="350000"/>
+              </a:schemeClr>
+            </a:gs>
+            <a:gs pos="40000">
+              <a:schemeClr val="phClr">
+                <a:tint val="45000"/>
+                <a:shade val="99000"/>
+                <a:satMod val="350000"/>
+              </a:schemeClr>
+            </a:gs>
+            <a:gs pos="100000">
+              <a:schemeClr val="phClr">
+                <a:shade val="20000"/>
+                <a:satMod val="255000"/>
+              </a:schemeClr>
+            </a:gs>
+          </a:gsLst>
+          <a:path path="circle">
+            <a:fillToRect l="50000" t="-80000" r="50000" b="180000"/>
+          </a:path>
+        </a:gradFill>
+        <a:gradFill rotWithShape="1">
+          <a:gsLst>
+            <a:gs pos="0">
+              <a:schemeClr val="phClr">
+                <a:tint val="80000"/>
+                <a:satMod val="300000"/>
+              </a:schemeClr>
+            </a:gs>
+            <a:gs pos="100000">
+              <a:schemeClr val="phClr">
+                <a:shade val="30000"/>
+                <a:satMod val="200000"/>
+              </a:schemeClr>
+            </a:gs>
+          </a:gsLst>
+          <a:path path="circle">
+            <a:fillToRect l="50000" t="50000" r="50000" b="50000"/>
+          </a:path>
+        </a:gradFill>
+      </a:bgFillStyleLst>
+    </a:fmtScheme>
+  </a:themeElements>
+  <a:objectDefaults>
+    <a:spDef>
+      <a:spPr/>
+      <a:bodyPr/>
+      <a:lstStyle/>
+      <a:style>
+        <a:lnRef idx="1">
+          <a:schemeClr val="accent1"/>
+        </a:lnRef>
+        <a:fillRef idx="3">
+          <a:schemeClr val="accent1"/>
+        </a:fillRef>
+        <a:effectRef idx="2">
+          <a:schemeClr val="accent1"/>
+        </a:effectRef>
+        <a:fontRef idx="minor">
+          <a:schemeClr val="lt1"/>
+        </a:fontRef>
+      </a:style>
+    </a:spDef>
+    <a:lnDef>
+      <a:spPr/>
+      <a:bodyPr/>
+      <a:lstStyle/>
+      <a:style>
+        <a:lnRef idx="2">
+          <a:schemeClr val="accent1"/>
+        </a:lnRef>
+        <a:fillRef idx="0">
+          <a:schemeClr val="accent1"/>
+        </a:fillRef>
+        <a:effectRef idx="1">
+          <a:schemeClr val="accent1"/>
+        </a:effectRef>
+        <a:fontRef idx="minor">
+          <a:schemeClr val="tx1"/>
+        </a:fontRef>
+      </a:style>
+    </a:lnDef>
+  </a:objectDefaults>
+  <a:extraClrSchemeLst/>
+</a:theme>
 </file>
</xml_diff>

<commit_message>
addded sales order orm example
</commit_message>
<xml_diff>
--- a/presentation/ODataERP II.pptx
+++ b/presentation/ODataERP II.pptx
@@ -5,10 +5,10 @@
     <p:sldMasterId id="2147483660" r:id="rId1"/>
   </p:sldMasterIdLst>
   <p:notesMasterIdLst>
-    <p:notesMasterId r:id="rId15"/>
+    <p:notesMasterId r:id="rId16"/>
   </p:notesMasterIdLst>
   <p:handoutMasterIdLst>
-    <p:handoutMasterId r:id="rId16"/>
+    <p:handoutMasterId r:id="rId17"/>
   </p:handoutMasterIdLst>
   <p:sldIdLst>
     <p:sldId id="256" r:id="rId2"/>
@@ -23,7 +23,8 @@
     <p:sldId id="273" r:id="rId11"/>
     <p:sldId id="274" r:id="rId12"/>
     <p:sldId id="283" r:id="rId13"/>
-    <p:sldId id="262" r:id="rId14"/>
+    <p:sldId id="286" r:id="rId14"/>
+    <p:sldId id="262" r:id="rId15"/>
   </p:sldIdLst>
   <p:sldSz cx="9144000" cy="6858000" type="screen4x3"/>
   <p:notesSz cx="6858000" cy="9144000"/>
@@ -185,13 +186,13 @@
                 <c:formatCode>General</c:formatCode>
                 <c:ptCount val="3"/>
                 <c:pt idx="0">
-                  <c:v>30.0</c:v>
+                  <c:v>30</c:v>
                 </c:pt>
                 <c:pt idx="1">
-                  <c:v>10.0</c:v>
+                  <c:v>10</c:v>
                 </c:pt>
                 <c:pt idx="2">
-                  <c:v>60.0</c:v>
+                  <c:v>60</c:v>
                 </c:pt>
               </c:numCache>
             </c:numRef>
@@ -236,13 +237,13 @@
                 <c:formatCode>General</c:formatCode>
                 <c:ptCount val="3"/>
                 <c:pt idx="0">
-                  <c:v>30.0</c:v>
+                  <c:v>30</c:v>
                 </c:pt>
                 <c:pt idx="1">
-                  <c:v>60.0</c:v>
+                  <c:v>60</c:v>
                 </c:pt>
                 <c:pt idx="2">
-                  <c:v>20.0</c:v>
+                  <c:v>20</c:v>
                 </c:pt>
               </c:numCache>
             </c:numRef>
@@ -287,13 +288,13 @@
                 <c:formatCode>General</c:formatCode>
                 <c:ptCount val="3"/>
                 <c:pt idx="0">
-                  <c:v>20.0</c:v>
+                  <c:v>20</c:v>
                 </c:pt>
                 <c:pt idx="1">
-                  <c:v>20.0</c:v>
+                  <c:v>20</c:v>
                 </c:pt>
                 <c:pt idx="2">
-                  <c:v>10.0</c:v>
+                  <c:v>10</c:v>
                 </c:pt>
               </c:numCache>
             </c:numRef>
@@ -338,13 +339,13 @@
                 <c:formatCode>General</c:formatCode>
                 <c:ptCount val="3"/>
                 <c:pt idx="0">
-                  <c:v>16.0</c:v>
+                  <c:v>16</c:v>
                 </c:pt>
                 <c:pt idx="1">
-                  <c:v>8.0</c:v>
+                  <c:v>8</c:v>
                 </c:pt>
                 <c:pt idx="2">
-                  <c:v>8.0</c:v>
+                  <c:v>8</c:v>
                 </c:pt>
               </c:numCache>
             </c:numRef>
@@ -389,13 +390,13 @@
                 <c:formatCode>General</c:formatCode>
                 <c:ptCount val="3"/>
                 <c:pt idx="0">
-                  <c:v>4.0</c:v>
+                  <c:v>4</c:v>
                 </c:pt>
                 <c:pt idx="1">
-                  <c:v>2.0</c:v>
+                  <c:v>2</c:v>
                 </c:pt>
                 <c:pt idx="2">
-                  <c:v>2.0</c:v>
+                  <c:v>2</c:v>
                 </c:pt>
               </c:numCache>
             </c:numRef>
@@ -411,11 +412,11 @@
         </c:dLbls>
         <c:gapWidth val="150"/>
         <c:overlap val="100"/>
-        <c:axId val="1863292920"/>
-        <c:axId val="1908109160"/>
+        <c:axId val="32975872"/>
+        <c:axId val="98487104"/>
       </c:barChart>
       <c:catAx>
-        <c:axId val="1863292920"/>
+        <c:axId val="32975872"/>
         <c:scaling>
           <c:orientation val="minMax"/>
         </c:scaling>
@@ -424,7 +425,7 @@
         <c:majorTickMark val="out"/>
         <c:minorTickMark val="none"/>
         <c:tickLblPos val="nextTo"/>
-        <c:crossAx val="1908109160"/>
+        <c:crossAx val="98487104"/>
         <c:crosses val="autoZero"/>
         <c:auto val="1"/>
         <c:lblAlgn val="ctr"/>
@@ -432,7 +433,7 @@
         <c:noMultiLvlLbl val="0"/>
       </c:catAx>
       <c:valAx>
-        <c:axId val="1908109160"/>
+        <c:axId val="98487104"/>
         <c:scaling>
           <c:orientation val="minMax"/>
         </c:scaling>
@@ -443,7 +444,7 @@
         <c:majorTickMark val="out"/>
         <c:minorTickMark val="none"/>
         <c:tickLblPos val="nextTo"/>
-        <c:crossAx val="1863292920"/>
+        <c:crossAx val="32975872"/>
         <c:crosses val="autoZero"/>
         <c:crossBetween val="between"/>
       </c:valAx>
@@ -555,7 +556,7 @@
           <a:p>
             <a:fld id="{571A509C-DBE6-F444-AAC2-EBB14B9E3373}" type="datetimeFigureOut">
               <a:rPr lang="en-US" smtClean="0"/>
-              <a:t>7/9/12</a:t>
+              <a:t>7/9/2012</a:t>
             </a:fld>
             <a:endParaRPr lang="en-US"/>
           </a:p>
@@ -621,7 +622,7 @@
           <a:p>
             <a:fld id="{9F85E8B4-F3D1-B34F-92CC-4A03728CD9B9}" type="slidenum">
               <a:rPr lang="en-US" smtClean="0"/>
-              <a:t>‹#›</a:t>
+              <a:t>‹Nr.›</a:t>
             </a:fld>
             <a:endParaRPr lang="en-US"/>
           </a:p>
@@ -721,7 +722,7 @@
           <a:p>
             <a:fld id="{F8F0D44B-776D-4908-B135-BED6833C9F76}" type="datetimeFigureOut">
               <a:rPr lang="en-US" smtClean="0"/>
-              <a:t>7/9/12</a:t>
+              <a:t>7/9/2012</a:t>
             </a:fld>
             <a:endParaRPr lang="en-US"/>
           </a:p>
@@ -880,7 +881,7 @@
           <a:p>
             <a:fld id="{044E5767-879F-458F-B26E-09FB80BCAC35}" type="slidenum">
               <a:rPr lang="en-US" smtClean="0"/>
-              <a:t>‹#›</a:t>
+              <a:t>‹Nr.›</a:t>
             </a:fld>
             <a:endParaRPr lang="en-US"/>
           </a:p>
@@ -1848,7 +1849,7 @@
           <a:p>
             <a:fld id="{044E5767-879F-458F-B26E-09FB80BCAC35}" type="slidenum">
               <a:rPr lang="en-US" smtClean="0"/>
-              <a:t>13</a:t>
+              <a:t>14</a:t>
             </a:fld>
             <a:endParaRPr lang="en-US"/>
           </a:p>
@@ -2054,7 +2055,7 @@
           <a:p>
             <a:fld id="{78300770-276E-9A42-B0EB-25F0A938FAD9}" type="datetime1">
               <a:rPr lang="en-US" smtClean="0"/>
-              <a:t>7/9/12</a:t>
+              <a:t>7/9/2012</a:t>
             </a:fld>
             <a:endParaRPr lang="en-US"/>
           </a:p>
@@ -2077,7 +2078,7 @@
           <a:p>
             <a:fld id="{466192DD-7082-457C-A0B1-061B97E09436}" type="slidenum">
               <a:rPr lang="en-US" smtClean="0"/>
-              <a:t>‹#›</a:t>
+              <a:t>‹Nr.›</a:t>
             </a:fld>
             <a:endParaRPr lang="en-US"/>
           </a:p>
@@ -2219,7 +2220,7 @@
           <a:p>
             <a:fld id="{C3B27A16-D319-7E46-9ECF-3E73CAD7A292}" type="datetime1">
               <a:rPr lang="en-US" smtClean="0"/>
-              <a:t>7/9/12</a:t>
+              <a:t>7/9/2012</a:t>
             </a:fld>
             <a:endParaRPr lang="en-US"/>
           </a:p>
@@ -2261,7 +2262,7 @@
           <a:p>
             <a:fld id="{466192DD-7082-457C-A0B1-061B97E09436}" type="slidenum">
               <a:rPr lang="en-US" smtClean="0"/>
-              <a:t>‹#›</a:t>
+              <a:t>‹Nr.›</a:t>
             </a:fld>
             <a:endParaRPr lang="en-US"/>
           </a:p>
@@ -2394,7 +2395,7 @@
           <a:p>
             <a:fld id="{5836FFB4-FB7B-9F41-85BC-85E8238A3BC6}" type="datetime1">
               <a:rPr lang="en-US" smtClean="0"/>
-              <a:t>7/9/12</a:t>
+              <a:t>7/9/2012</a:t>
             </a:fld>
             <a:endParaRPr lang="en-US"/>
           </a:p>
@@ -2436,7 +2437,7 @@
           <a:p>
             <a:fld id="{466192DD-7082-457C-A0B1-061B97E09436}" type="slidenum">
               <a:rPr lang="en-US" smtClean="0"/>
-              <a:t>‹#›</a:t>
+              <a:t>‹Nr.›</a:t>
             </a:fld>
             <a:endParaRPr lang="en-US"/>
           </a:p>
@@ -2559,7 +2560,7 @@
           <a:p>
             <a:fld id="{8EFCF8AA-F9CD-BE43-9FDB-CA800991B15A}" type="datetime1">
               <a:rPr lang="en-US" smtClean="0"/>
-              <a:t>7/9/12</a:t>
+              <a:t>7/9/2012</a:t>
             </a:fld>
             <a:endParaRPr lang="en-US"/>
           </a:p>
@@ -2601,7 +2602,7 @@
           <a:p>
             <a:fld id="{466192DD-7082-457C-A0B1-061B97E09436}" type="slidenum">
               <a:rPr lang="en-US" smtClean="0"/>
-              <a:t>‹#›</a:t>
+              <a:t>‹Nr.›</a:t>
             </a:fld>
             <a:endParaRPr lang="en-US"/>
           </a:p>
@@ -2798,7 +2799,7 @@
           <a:p>
             <a:fld id="{AB237E31-A67A-1F4C-B9A0-E025AB3F1910}" type="datetime1">
               <a:rPr lang="en-US" smtClean="0"/>
-              <a:t>7/9/12</a:t>
+              <a:t>7/9/2012</a:t>
             </a:fld>
             <a:endParaRPr lang="en-US"/>
           </a:p>
@@ -2840,7 +2841,7 @@
           <a:p>
             <a:fld id="{466192DD-7082-457C-A0B1-061B97E09436}" type="slidenum">
               <a:rPr lang="en-US" smtClean="0"/>
-              <a:t>‹#›</a:t>
+              <a:t>‹Nr.›</a:t>
             </a:fld>
             <a:endParaRPr lang="en-US"/>
           </a:p>
@@ -2888,7 +2889,7 @@
           <a:p>
             <a:fld id="{77EB0B02-2E6D-5641-A8FD-A9CC43F53571}" type="datetime1">
               <a:rPr lang="en-US" smtClean="0"/>
-              <a:t>7/9/12</a:t>
+              <a:t>7/9/2012</a:t>
             </a:fld>
             <a:endParaRPr lang="en-US"/>
           </a:p>
@@ -2930,7 +2931,7 @@
           <a:p>
             <a:fld id="{466192DD-7082-457C-A0B1-061B97E09436}" type="slidenum">
               <a:rPr lang="en-US" smtClean="0"/>
-              <a:t>‹#›</a:t>
+              <a:t>‹Nr.›</a:t>
             </a:fld>
             <a:endParaRPr lang="en-US"/>
           </a:p>
@@ -3262,7 +3263,7 @@
           <a:p>
             <a:fld id="{9D50740B-3BA0-6241-9956-5EBA4007AD45}" type="datetime1">
               <a:rPr lang="en-US" smtClean="0"/>
-              <a:t>7/9/12</a:t>
+              <a:t>7/9/2012</a:t>
             </a:fld>
             <a:endParaRPr lang="en-US"/>
           </a:p>
@@ -3304,7 +3305,7 @@
           <a:p>
             <a:fld id="{466192DD-7082-457C-A0B1-061B97E09436}" type="slidenum">
               <a:rPr lang="en-US" smtClean="0"/>
-              <a:t>‹#›</a:t>
+              <a:t>‹Nr.›</a:t>
             </a:fld>
             <a:endParaRPr lang="en-US"/>
           </a:p>
@@ -3517,7 +3518,7 @@
           <a:p>
             <a:fld id="{A5FD6762-E8A7-3E4D-9013-8E481C64A100}" type="datetime1">
               <a:rPr lang="en-US" smtClean="0"/>
-              <a:t>7/9/12</a:t>
+              <a:t>7/9/2012</a:t>
             </a:fld>
             <a:endParaRPr lang="en-US"/>
           </a:p>
@@ -3559,7 +3560,7 @@
           <a:p>
             <a:fld id="{466192DD-7082-457C-A0B1-061B97E09436}" type="slidenum">
               <a:rPr lang="en-US" smtClean="0"/>
-              <a:t>‹#›</a:t>
+              <a:t>‹Nr.›</a:t>
             </a:fld>
             <a:endParaRPr lang="en-US"/>
           </a:p>
@@ -3607,7 +3608,7 @@
           <a:p>
             <a:fld id="{9FE5D640-6435-5F4B-8C6F-8A35C7BCC29A}" type="datetime1">
               <a:rPr lang="en-US" smtClean="0"/>
-              <a:t>7/9/12</a:t>
+              <a:t>7/9/2012</a:t>
             </a:fld>
             <a:endParaRPr lang="en-US"/>
           </a:p>
@@ -3649,7 +3650,7 @@
           <a:p>
             <a:fld id="{466192DD-7082-457C-A0B1-061B97E09436}" type="slidenum">
               <a:rPr lang="en-US" smtClean="0"/>
-              <a:t>‹#›</a:t>
+              <a:t>‹Nr.›</a:t>
             </a:fld>
             <a:endParaRPr lang="en-US"/>
           </a:p>
@@ -3881,7 +3882,7 @@
           <a:p>
             <a:fld id="{828E4C5B-7202-4343-8573-2E3FE581944A}" type="datetime1">
               <a:rPr lang="en-US" smtClean="0"/>
-              <a:t>7/9/12</a:t>
+              <a:t>7/9/2012</a:t>
             </a:fld>
             <a:endParaRPr lang="en-US"/>
           </a:p>
@@ -3923,7 +3924,7 @@
           <a:p>
             <a:fld id="{466192DD-7082-457C-A0B1-061B97E09436}" type="slidenum">
               <a:rPr lang="en-US" smtClean="0"/>
-              <a:t>‹#›</a:t>
+              <a:t>‹Nr.›</a:t>
             </a:fld>
             <a:endParaRPr lang="en-US"/>
           </a:p>
@@ -4153,7 +4154,7 @@
           <a:p>
             <a:fld id="{DB95259F-66E4-3B4F-B7C5-1FA29269A57C}" type="datetime1">
               <a:rPr lang="en-US" smtClean="0"/>
-              <a:t>7/9/12</a:t>
+              <a:t>7/9/2012</a:t>
             </a:fld>
             <a:endParaRPr lang="en-US"/>
           </a:p>
@@ -4195,7 +4196,7 @@
           <a:p>
             <a:fld id="{466192DD-7082-457C-A0B1-061B97E09436}" type="slidenum">
               <a:rPr lang="en-US" smtClean="0"/>
-              <a:t>‹#›</a:t>
+              <a:t>‹Nr.›</a:t>
             </a:fld>
             <a:endParaRPr lang="en-US"/>
           </a:p>
@@ -4453,7 +4454,7 @@
           <a:p>
             <a:fld id="{178FB6F8-A9EA-C04B-A771-0D18B5B184A5}" type="datetime1">
               <a:rPr lang="en-US" smtClean="0"/>
-              <a:t>7/9/12</a:t>
+              <a:t>7/9/2012</a:t>
             </a:fld>
             <a:endParaRPr lang="en-US"/>
           </a:p>
@@ -4492,7 +4493,7 @@
           <a:p>
             <a:fld id="{466192DD-7082-457C-A0B1-061B97E09436}" type="slidenum">
               <a:rPr lang="en-US" smtClean="0"/>
-              <a:t>‹#›</a:t>
+              <a:t>‹Nr.›</a:t>
             </a:fld>
             <a:endParaRPr lang="en-US"/>
           </a:p>
@@ -4984,7 +4985,7 @@
           </a:prstGeom>
           <a:noFill/>
           <a:extLst>
-            <a:ext uri="{909E8E84-426E-40dd-AFC4-6F175D3DCCD1}">
+            <a:ext uri="{909E8E84-426E-40DD-AFC4-6F175D3DCCD1}">
               <a14:hiddenFill xmlns:a14="http://schemas.microsoft.com/office/drawing/2010/main">
                 <a:solidFill>
                   <a:srgbClr val="FFFFFF"/>
@@ -5030,7 +5031,7 @@
   <p:timing>
     <p:tnLst>
       <p:par>
-        <p:cTn xmlns:p14="http://schemas.microsoft.com/office/powerpoint/2010/main" id="1" dur="indefinite" restart="never" nodeType="tmRoot"/>
+        <p:cTn id="1" dur="indefinite" restart="never" nodeType="tmRoot"/>
       </p:par>
     </p:tnLst>
   </p:timing>
@@ -5199,7 +5200,7 @@
   <p:timing>
     <p:tnLst>
       <p:par>
-        <p:cTn xmlns:p14="http://schemas.microsoft.com/office/powerpoint/2010/main" id="1" dur="indefinite" restart="never" nodeType="tmRoot"/>
+        <p:cTn id="1" dur="indefinite" restart="never" nodeType="tmRoot"/>
       </p:par>
     </p:tnLst>
   </p:timing>
@@ -5367,7 +5368,7 @@
   <p:timing>
     <p:tnLst>
       <p:par>
-        <p:cTn xmlns:p14="http://schemas.microsoft.com/office/powerpoint/2010/main" id="1" dur="indefinite" restart="never" nodeType="tmRoot"/>
+        <p:cTn id="1" dur="indefinite" restart="never" nodeType="tmRoot"/>
       </p:par>
     </p:tnLst>
   </p:timing>
@@ -5462,14 +5463,14 @@
           </a:ln>
           <a:effectLst/>
           <a:extLst>
-            <a:ext uri="{909E8E84-426E-40dd-AFC4-6F175D3DCCD1}">
+            <a:ext uri="{909E8E84-426E-40DD-AFC4-6F175D3DCCD1}">
               <a14:hiddenFill xmlns:a14="http://schemas.microsoft.com/office/drawing/2010/main">
                 <a:solidFill>
                   <a:schemeClr val="accent1"/>
                 </a:solidFill>
               </a14:hiddenFill>
             </a:ext>
-            <a:ext uri="{91240B29-F687-4f45-9708-019B960494DF}">
+            <a:ext uri="{91240B29-F687-4F45-9708-019B960494DF}">
               <a14:hiddenLine xmlns:a14="http://schemas.microsoft.com/office/drawing/2010/main" w="9525">
                 <a:solidFill>
                   <a:schemeClr val="tx1"/>
@@ -5479,7 +5480,7 @@
                 <a:tailEnd/>
               </a14:hiddenLine>
             </a:ext>
-            <a:ext uri="{AF507438-7753-43e0-B8FC-AC1667EBCBE1}">
+            <a:ext uri="{AF507438-7753-43E0-B8FC-AC1667EBCBE1}">
               <a14:hiddenEffects xmlns:a14="http://schemas.microsoft.com/office/drawing/2010/main">
                 <a:effectLst>
                   <a:outerShdw dist="35921" dir="2700000" algn="ctr" rotWithShape="0">
@@ -5527,7 +5528,7 @@
   <p:timing>
     <p:tnLst>
       <p:par>
-        <p:cTn xmlns:p14="http://schemas.microsoft.com/office/powerpoint/2010/main" id="1" dur="indefinite" restart="never" nodeType="tmRoot"/>
+        <p:cTn id="1" dur="indefinite" restart="never" nodeType="tmRoot"/>
       </p:par>
     </p:tnLst>
   </p:timing>
@@ -5553,126 +5554,7 @@
       </p:grpSpPr>
       <p:sp>
         <p:nvSpPr>
-          <p:cNvPr id="2" name="Titel 1"/>
-          <p:cNvSpPr>
-            <a:spLocks noGrp="1"/>
-          </p:cNvSpPr>
-          <p:nvPr>
-            <p:ph type="title"/>
-          </p:nvPr>
-        </p:nvSpPr>
-        <p:spPr/>
-        <p:txBody>
-          <a:bodyPr/>
-          <a:lstStyle/>
-          <a:p>
-            <a:r>
-              <a:rPr lang="en-US" dirty="0" smtClean="0"/>
-              <a:t>Conclusion</a:t>
-            </a:r>
-            <a:endParaRPr lang="en-US" dirty="0"/>
-          </a:p>
-        </p:txBody>
-      </p:sp>
-      <p:sp>
-        <p:nvSpPr>
-          <p:cNvPr id="3" name="Inhaltsplatzhalter 2"/>
-          <p:cNvSpPr>
-            <a:spLocks noGrp="1"/>
-          </p:cNvSpPr>
-          <p:nvPr>
-            <p:ph idx="1"/>
-          </p:nvPr>
-        </p:nvSpPr>
-        <p:spPr/>
-        <p:txBody>
-          <a:bodyPr/>
-          <a:lstStyle/>
-          <a:p>
-            <a:r>
-              <a:rPr lang="en-US" dirty="0" err="1" smtClean="0"/>
-              <a:t>OData</a:t>
-            </a:r>
-            <a:r>
-              <a:rPr lang="en-US" dirty="0" smtClean="0"/>
-              <a:t> is great for exposing data for reading access</a:t>
-            </a:r>
-          </a:p>
-          <a:p>
-            <a:pPr lvl="1"/>
-            <a:r>
-              <a:rPr lang="de-DE" dirty="0"/>
-              <a:t>Expressive </a:t>
-            </a:r>
-            <a:r>
-              <a:rPr lang="de-DE" dirty="0" err="1"/>
-              <a:t>filter</a:t>
-            </a:r>
-            <a:r>
-              <a:rPr lang="de-DE" dirty="0"/>
-              <a:t> </a:t>
-            </a:r>
-            <a:r>
-              <a:rPr lang="de-DE" dirty="0" err="1"/>
-              <a:t>syntax</a:t>
-            </a:r>
-            <a:endParaRPr lang="en-US" dirty="0" smtClean="0"/>
-          </a:p>
-          <a:p>
-            <a:r>
-              <a:rPr lang="en-US" dirty="0" smtClean="0"/>
-              <a:t>OData is great for smaller analytics/publishing apps</a:t>
-            </a:r>
-          </a:p>
-          <a:p>
-            <a:r>
-              <a:rPr lang="en-US" dirty="0" smtClean="0"/>
-              <a:t>Application server can be crated automatically</a:t>
-            </a:r>
-          </a:p>
-          <a:p>
-            <a:pPr lvl="1"/>
-            <a:r>
-              <a:rPr lang="en-US" dirty="0" smtClean="0"/>
-              <a:t>Logic lies in Database and JavaScript</a:t>
-            </a:r>
-          </a:p>
-          <a:p>
-            <a:pPr lvl="1"/>
-            <a:r>
-              <a:rPr lang="en-US" dirty="0" smtClean="0"/>
-              <a:t>One layer of complexity removed</a:t>
-            </a:r>
-          </a:p>
-          <a:p>
-            <a:endParaRPr lang="de-DE" dirty="0"/>
-          </a:p>
-          <a:p>
-            <a:r>
-              <a:rPr lang="en-US" dirty="0" smtClean="0"/>
-              <a:t>Some security &amp; application state issues in business context</a:t>
-            </a:r>
-          </a:p>
-          <a:p>
-            <a:pPr lvl="1"/>
-            <a:r>
-              <a:rPr lang="de-DE" dirty="0" smtClean="0"/>
-              <a:t>DOS</a:t>
-            </a:r>
-          </a:p>
-          <a:p>
-            <a:pPr lvl="1"/>
-            <a:r>
-              <a:rPr lang="de-DE" dirty="0" smtClean="0"/>
-              <a:t>Transaction State</a:t>
-            </a:r>
-            <a:endParaRPr lang="en-US" dirty="0" smtClean="0"/>
-          </a:p>
-        </p:txBody>
-      </p:sp>
-      <p:sp>
-        <p:nvSpPr>
-          <p:cNvPr id="4" name="Slide Number Placeholder 3"/>
+          <p:cNvPr id="4" name="Foliennummernplatzhalter 3"/>
           <p:cNvSpPr>
             <a:spLocks noGrp="1"/>
           </p:cNvSpPr>
@@ -5688,6 +5570,382 @@
             <a:fld id="{466192DD-7082-457C-A0B1-061B97E09436}" type="slidenum">
               <a:rPr lang="en-US" smtClean="0"/>
               <a:t>13</a:t>
+            </a:fld>
+            <a:endParaRPr lang="en-US"/>
+          </a:p>
+        </p:txBody>
+      </p:sp>
+      <p:pic>
+        <p:nvPicPr>
+          <p:cNvPr id="1026" name="Picture 2"/>
+          <p:cNvPicPr>
+            <a:picLocks noChangeAspect="1" noChangeArrowheads="1"/>
+          </p:cNvPicPr>
+          <p:nvPr/>
+        </p:nvPicPr>
+        <p:blipFill rotWithShape="1">
+          <a:blip r:embed="rId2">
+            <a:extLst>
+              <a:ext uri="{28A0092B-C50C-407E-A947-70E740481C1C}">
+                <a14:useLocalDpi xmlns:a14="http://schemas.microsoft.com/office/drawing/2010/main" val="0"/>
+              </a:ext>
+            </a:extLst>
+          </a:blip>
+          <a:srcRect l="561" t="8164" r="55107" b="16507"/>
+          <a:stretch/>
+        </p:blipFill>
+        <p:spPr bwMode="auto">
+          <a:xfrm>
+            <a:off x="9129" y="-27384"/>
+            <a:ext cx="6651104" cy="6827983"/>
+          </a:xfrm>
+          <a:prstGeom prst="rect">
+            <a:avLst/>
+          </a:prstGeom>
+          <a:noFill/>
+          <a:ln>
+            <a:noFill/>
+          </a:ln>
+          <a:effectLst/>
+          <a:extLst>
+            <a:ext uri="{909E8E84-426E-40DD-AFC4-6F175D3DCCD1}">
+              <a14:hiddenFill xmlns:a14="http://schemas.microsoft.com/office/drawing/2010/main">
+                <a:solidFill>
+                  <a:schemeClr val="accent1"/>
+                </a:solidFill>
+              </a14:hiddenFill>
+            </a:ext>
+            <a:ext uri="{91240B29-F687-4F45-9708-019B960494DF}">
+              <a14:hiddenLine xmlns:a14="http://schemas.microsoft.com/office/drawing/2010/main" w="9525">
+                <a:solidFill>
+                  <a:schemeClr val="tx1"/>
+                </a:solidFill>
+                <a:miter lim="800000"/>
+                <a:headEnd/>
+                <a:tailEnd/>
+              </a14:hiddenLine>
+            </a:ext>
+            <a:ext uri="{AF507438-7753-43E0-B8FC-AC1667EBCBE1}">
+              <a14:hiddenEffects xmlns:a14="http://schemas.microsoft.com/office/drawing/2010/main">
+                <a:effectLst>
+                  <a:outerShdw dist="35921" dir="2700000" algn="ctr" rotWithShape="0">
+                    <a:schemeClr val="bg2"/>
+                  </a:outerShdw>
+                </a:effectLst>
+              </a14:hiddenEffects>
+            </a:ext>
+          </a:extLst>
+        </p:spPr>
+      </p:pic>
+      <p:pic>
+        <p:nvPicPr>
+          <p:cNvPr id="1027" name="Picture 3"/>
+          <p:cNvPicPr>
+            <a:picLocks noChangeAspect="1" noChangeArrowheads="1"/>
+          </p:cNvPicPr>
+          <p:nvPr/>
+        </p:nvPicPr>
+        <p:blipFill rotWithShape="1">
+          <a:blip r:embed="rId2">
+            <a:extLst>
+              <a:ext uri="{28A0092B-C50C-407E-A947-70E740481C1C}">
+                <a14:useLocalDpi xmlns:a14="http://schemas.microsoft.com/office/drawing/2010/main" val="0"/>
+              </a:ext>
+            </a:extLst>
+          </a:blip>
+          <a:srcRect l="47083" t="8359" r="5000" b="64484"/>
+          <a:stretch/>
+        </p:blipFill>
+        <p:spPr bwMode="auto">
+          <a:xfrm>
+            <a:off x="251520" y="2247900"/>
+            <a:ext cx="8763000" cy="3000772"/>
+          </a:xfrm>
+          <a:prstGeom prst="rect">
+            <a:avLst/>
+          </a:prstGeom>
+          <a:ln>
+            <a:noFill/>
+          </a:ln>
+          <a:effectLst>
+            <a:outerShdw blurRad="190500" algn="tl" rotWithShape="0">
+              <a:srgbClr val="000000">
+                <a:alpha val="70000"/>
+              </a:srgbClr>
+            </a:outerShdw>
+          </a:effectLst>
+          <a:extLst>
+            <a:ext uri="{909E8E84-426E-40DD-AFC4-6F175D3DCCD1}">
+              <a14:hiddenFill xmlns:a14="http://schemas.microsoft.com/office/drawing/2010/main">
+                <a:solidFill>
+                  <a:schemeClr val="accent1"/>
+                </a:solidFill>
+              </a14:hiddenFill>
+            </a:ext>
+            <a:ext uri="{91240B29-F687-4F45-9708-019B960494DF}">
+              <a14:hiddenLine xmlns:a14="http://schemas.microsoft.com/office/drawing/2010/main" w="9525">
+                <a:solidFill>
+                  <a:schemeClr val="tx1"/>
+                </a:solidFill>
+                <a:miter lim="800000"/>
+                <a:headEnd/>
+                <a:tailEnd/>
+              </a14:hiddenLine>
+            </a:ext>
+            <a:ext uri="{AF507438-7753-43E0-B8FC-AC1667EBCBE1}">
+              <a14:hiddenEffects xmlns:a14="http://schemas.microsoft.com/office/drawing/2010/main">
+                <a:effectLst>
+                  <a:outerShdw dist="35921" dir="2700000" algn="ctr" rotWithShape="0">
+                    <a:schemeClr val="bg2"/>
+                  </a:outerShdw>
+                </a:effectLst>
+              </a14:hiddenEffects>
+            </a:ext>
+          </a:extLst>
+        </p:spPr>
+      </p:pic>
+    </p:spTree>
+    <p:extLst>
+      <p:ext uri="{BB962C8B-B14F-4D97-AF65-F5344CB8AC3E}">
+        <p14:creationId xmlns:p14="http://schemas.microsoft.com/office/powerpoint/2010/main" val="2147362660"/>
+      </p:ext>
+    </p:extLst>
+  </p:cSld>
+  <p:clrMapOvr>
+    <a:masterClrMapping/>
+  </p:clrMapOvr>
+  <p:timing>
+    <p:tnLst>
+      <p:par>
+        <p:cTn id="1" dur="indefinite" restart="never" nodeType="tmRoot">
+          <p:childTnLst>
+            <p:seq concurrent="1" nextAc="seek">
+              <p:cTn id="2" dur="indefinite" nodeType="mainSeq">
+                <p:childTnLst>
+                  <p:par>
+                    <p:cTn id="3" fill="hold">
+                      <p:stCondLst>
+                        <p:cond delay="indefinite"/>
+                      </p:stCondLst>
+                      <p:childTnLst>
+                        <p:par>
+                          <p:cTn id="4" fill="hold">
+                            <p:stCondLst>
+                              <p:cond delay="0"/>
+                            </p:stCondLst>
+                            <p:childTnLst>
+                              <p:par>
+                                <p:cTn id="5" presetID="1" presetClass="entr" presetSubtype="0" fill="hold" nodeType="clickEffect">
+                                  <p:stCondLst>
+                                    <p:cond delay="0"/>
+                                  </p:stCondLst>
+                                  <p:childTnLst>
+                                    <p:set>
+                                      <p:cBhvr>
+                                        <p:cTn id="6" dur="1" fill="hold">
+                                          <p:stCondLst>
+                                            <p:cond delay="0"/>
+                                          </p:stCondLst>
+                                        </p:cTn>
+                                        <p:tgtEl>
+                                          <p:spTgt spid="1027"/>
+                                        </p:tgtEl>
+                                        <p:attrNameLst>
+                                          <p:attrName>style.visibility</p:attrName>
+                                        </p:attrNameLst>
+                                      </p:cBhvr>
+                                      <p:to>
+                                        <p:strVal val="visible"/>
+                                      </p:to>
+                                    </p:set>
+                                  </p:childTnLst>
+                                </p:cTn>
+                              </p:par>
+                            </p:childTnLst>
+                          </p:cTn>
+                        </p:par>
+                      </p:childTnLst>
+                    </p:cTn>
+                  </p:par>
+                </p:childTnLst>
+              </p:cTn>
+              <p:prevCondLst>
+                <p:cond evt="onPrev" delay="0">
+                  <p:tgtEl>
+                    <p:sldTgt/>
+                  </p:tgtEl>
+                </p:cond>
+              </p:prevCondLst>
+              <p:nextCondLst>
+                <p:cond evt="onNext" delay="0">
+                  <p:tgtEl>
+                    <p:sldTgt/>
+                  </p:tgtEl>
+                </p:cond>
+              </p:nextCondLst>
+            </p:seq>
+          </p:childTnLst>
+        </p:cTn>
+      </p:par>
+    </p:tnLst>
+  </p:timing>
+</p:sld>
+</file>
+
+<file path=ppt/slides/slide14.xml><?xml version="1.0" encoding="utf-8"?>
+<p:sld xmlns:a="http://schemas.openxmlformats.org/drawingml/2006/main" xmlns:r="http://schemas.openxmlformats.org/officeDocument/2006/relationships" xmlns:p="http://schemas.openxmlformats.org/presentationml/2006/main">
+  <p:cSld>
+    <p:spTree>
+      <p:nvGrpSpPr>
+        <p:cNvPr id="1" name=""/>
+        <p:cNvGrpSpPr/>
+        <p:nvPr/>
+      </p:nvGrpSpPr>
+      <p:grpSpPr>
+        <a:xfrm>
+          <a:off x="0" y="0"/>
+          <a:ext cx="0" cy="0"/>
+          <a:chOff x="0" y="0"/>
+          <a:chExt cx="0" cy="0"/>
+        </a:xfrm>
+      </p:grpSpPr>
+      <p:sp>
+        <p:nvSpPr>
+          <p:cNvPr id="2" name="Titel 1"/>
+          <p:cNvSpPr>
+            <a:spLocks noGrp="1"/>
+          </p:cNvSpPr>
+          <p:nvPr>
+            <p:ph type="title"/>
+          </p:nvPr>
+        </p:nvSpPr>
+        <p:spPr/>
+        <p:txBody>
+          <a:bodyPr/>
+          <a:lstStyle/>
+          <a:p>
+            <a:r>
+              <a:rPr lang="en-US" dirty="0" smtClean="0"/>
+              <a:t>Conclusion</a:t>
+            </a:r>
+            <a:endParaRPr lang="en-US" dirty="0"/>
+          </a:p>
+        </p:txBody>
+      </p:sp>
+      <p:sp>
+        <p:nvSpPr>
+          <p:cNvPr id="3" name="Inhaltsplatzhalter 2"/>
+          <p:cNvSpPr>
+            <a:spLocks noGrp="1"/>
+          </p:cNvSpPr>
+          <p:nvPr>
+            <p:ph idx="1"/>
+          </p:nvPr>
+        </p:nvSpPr>
+        <p:spPr/>
+        <p:txBody>
+          <a:bodyPr/>
+          <a:lstStyle/>
+          <a:p>
+            <a:r>
+              <a:rPr lang="en-US" dirty="0" err="1" smtClean="0"/>
+              <a:t>OData</a:t>
+            </a:r>
+            <a:r>
+              <a:rPr lang="en-US" dirty="0" smtClean="0"/>
+              <a:t> is great for exposing data for reading access</a:t>
+            </a:r>
+          </a:p>
+          <a:p>
+            <a:pPr lvl="1"/>
+            <a:r>
+              <a:rPr lang="de-DE" dirty="0"/>
+              <a:t>Expressive </a:t>
+            </a:r>
+            <a:r>
+              <a:rPr lang="de-DE" dirty="0" err="1"/>
+              <a:t>filter</a:t>
+            </a:r>
+            <a:r>
+              <a:rPr lang="de-DE" dirty="0"/>
+              <a:t> </a:t>
+            </a:r>
+            <a:r>
+              <a:rPr lang="de-DE" dirty="0" err="1"/>
+              <a:t>syntax</a:t>
+            </a:r>
+            <a:endParaRPr lang="en-US" dirty="0" smtClean="0"/>
+          </a:p>
+          <a:p>
+            <a:r>
+              <a:rPr lang="en-US" dirty="0" smtClean="0"/>
+              <a:t>OData is great for smaller analytics/publishing apps</a:t>
+            </a:r>
+          </a:p>
+          <a:p>
+            <a:r>
+              <a:rPr lang="en-US" dirty="0" smtClean="0"/>
+              <a:t>Application server can be crated automatically</a:t>
+            </a:r>
+          </a:p>
+          <a:p>
+            <a:pPr lvl="1"/>
+            <a:r>
+              <a:rPr lang="en-US" dirty="0" smtClean="0"/>
+              <a:t>Logic lies in Database and JavaScript</a:t>
+            </a:r>
+          </a:p>
+          <a:p>
+            <a:pPr lvl="1"/>
+            <a:r>
+              <a:rPr lang="en-US" dirty="0" smtClean="0"/>
+              <a:t>One layer of complexity removed</a:t>
+            </a:r>
+          </a:p>
+          <a:p>
+            <a:endParaRPr lang="de-DE" dirty="0"/>
+          </a:p>
+          <a:p>
+            <a:r>
+              <a:rPr lang="en-US" dirty="0" smtClean="0"/>
+              <a:t>Some security &amp; application state issues in business context</a:t>
+            </a:r>
+          </a:p>
+          <a:p>
+            <a:pPr lvl="1"/>
+            <a:r>
+              <a:rPr lang="de-DE" dirty="0" smtClean="0"/>
+              <a:t>DOS</a:t>
+            </a:r>
+          </a:p>
+          <a:p>
+            <a:pPr lvl="1"/>
+            <a:r>
+              <a:rPr lang="de-DE" dirty="0" smtClean="0"/>
+              <a:t>Transaction State</a:t>
+            </a:r>
+            <a:endParaRPr lang="en-US" dirty="0" smtClean="0"/>
+          </a:p>
+        </p:txBody>
+      </p:sp>
+      <p:sp>
+        <p:nvSpPr>
+          <p:cNvPr id="4" name="Slide Number Placeholder 3"/>
+          <p:cNvSpPr>
+            <a:spLocks noGrp="1"/>
+          </p:cNvSpPr>
+          <p:nvPr>
+            <p:ph type="sldNum" sz="quarter" idx="12"/>
+          </p:nvPr>
+        </p:nvSpPr>
+        <p:spPr/>
+        <p:txBody>
+          <a:bodyPr/>
+          <a:lstStyle/>
+          <a:p>
+            <a:fld id="{466192DD-7082-457C-A0B1-061B97E09436}" type="slidenum">
+              <a:rPr lang="en-US" smtClean="0"/>
+              <a:t>14</a:t>
             </a:fld>
             <a:endParaRPr lang="en-US"/>
           </a:p>
@@ -5714,7 +5972,7 @@
   <p:timing>
     <p:tnLst>
       <p:par>
-        <p:cTn xmlns:p14="http://schemas.microsoft.com/office/powerpoint/2010/main" id="1" dur="indefinite" restart="never" nodeType="tmRoot"/>
+        <p:cTn id="1" dur="indefinite" restart="never" nodeType="tmRoot"/>
       </p:par>
     </p:tnLst>
   </p:timing>
@@ -5845,14 +6103,14 @@
             </a:outerShdw>
           </a:effectLst>
           <a:extLst>
-            <a:ext uri="{909E8E84-426E-40dd-AFC4-6F175D3DCCD1}">
+            <a:ext uri="{909E8E84-426E-40DD-AFC4-6F175D3DCCD1}">
               <a14:hiddenFill xmlns:a14="http://schemas.microsoft.com/office/drawing/2010/main">
                 <a:solidFill>
                   <a:schemeClr val="accent1"/>
                 </a:solidFill>
               </a14:hiddenFill>
             </a:ext>
-            <a:ext uri="{91240B29-F687-4f45-9708-019B960494DF}">
+            <a:ext uri="{91240B29-F687-4F45-9708-019B960494DF}">
               <a14:hiddenLine xmlns:a14="http://schemas.microsoft.com/office/drawing/2010/main" w="9525">
                 <a:solidFill>
                   <a:schemeClr val="tx1"/>
@@ -5898,6 +6156,13 @@
   <p:clrMapOvr>
     <a:masterClrMapping/>
   </p:clrMapOvr>
+  <p:timing>
+    <p:tnLst>
+      <p:par>
+        <p:cTn id="1" dur="indefinite" restart="never" nodeType="tmRoot"/>
+      </p:par>
+    </p:tnLst>
+  </p:timing>
 </p:sld>
 </file>
 
@@ -6025,14 +6290,14 @@
             </a:outerShdw>
           </a:effectLst>
           <a:extLst>
-            <a:ext uri="{909E8E84-426E-40dd-AFC4-6F175D3DCCD1}">
+            <a:ext uri="{909E8E84-426E-40DD-AFC4-6F175D3DCCD1}">
               <a14:hiddenFill xmlns:a14="http://schemas.microsoft.com/office/drawing/2010/main">
                 <a:solidFill>
                   <a:schemeClr val="accent1"/>
                 </a:solidFill>
               </a14:hiddenFill>
             </a:ext>
-            <a:ext uri="{91240B29-F687-4f45-9708-019B960494DF}">
+            <a:ext uri="{91240B29-F687-4F45-9708-019B960494DF}">
               <a14:hiddenLine xmlns:a14="http://schemas.microsoft.com/office/drawing/2010/main" w="9525">
                 <a:solidFill>
                   <a:schemeClr val="tx1"/>
@@ -6083,14 +6348,14 @@
             </a:outerShdw>
           </a:effectLst>
           <a:extLst>
-            <a:ext uri="{909E8E84-426E-40dd-AFC4-6F175D3DCCD1}">
+            <a:ext uri="{909E8E84-426E-40DD-AFC4-6F175D3DCCD1}">
               <a14:hiddenFill xmlns:a14="http://schemas.microsoft.com/office/drawing/2010/main">
                 <a:solidFill>
                   <a:schemeClr val="accent1"/>
                 </a:solidFill>
               </a14:hiddenFill>
             </a:ext>
-            <a:ext uri="{91240B29-F687-4f45-9708-019B960494DF}">
+            <a:ext uri="{91240B29-F687-4F45-9708-019B960494DF}">
               <a14:hiddenLine xmlns:a14="http://schemas.microsoft.com/office/drawing/2010/main" w="9525">
                 <a:solidFill>
                   <a:schemeClr val="tx1"/>
@@ -6136,6 +6401,13 @@
   <p:clrMapOvr>
     <a:masterClrMapping/>
   </p:clrMapOvr>
+  <p:timing>
+    <p:tnLst>
+      <p:par>
+        <p:cTn id="1" dur="indefinite" restart="never" nodeType="tmRoot"/>
+      </p:par>
+    </p:tnLst>
+  </p:timing>
 </p:sld>
 </file>
 
@@ -6284,7 +6556,7 @@
   <p:timing>
     <p:tnLst>
       <p:par>
-        <p:cTn xmlns:p14="http://schemas.microsoft.com/office/powerpoint/2010/main" id="1" dur="indefinite" restart="never" nodeType="tmRoot"/>
+        <p:cTn id="1" dur="indefinite" restart="never" nodeType="tmRoot"/>
       </p:par>
     </p:tnLst>
   </p:timing>
@@ -7026,7 +7298,7 @@
   <p:timing>
     <p:tnLst>
       <p:par>
-        <p:cTn xmlns:p14="http://schemas.microsoft.com/office/powerpoint/2010/main" id="1" dur="indefinite" restart="never" nodeType="tmRoot"/>
+        <p:cTn id="1" dur="indefinite" restart="never" nodeType="tmRoot"/>
       </p:par>
     </p:tnLst>
   </p:timing>
@@ -7125,14 +7397,14 @@
           </a:ln>
           <a:effectLst/>
           <a:extLst>
-            <a:ext uri="{909E8E84-426E-40dd-AFC4-6F175D3DCCD1}">
+            <a:ext uri="{909E8E84-426E-40DD-AFC4-6F175D3DCCD1}">
               <a14:hiddenFill xmlns:a14="http://schemas.microsoft.com/office/drawing/2010/main">
                 <a:solidFill>
                   <a:schemeClr val="accent1"/>
                 </a:solidFill>
               </a14:hiddenFill>
             </a:ext>
-            <a:ext uri="{91240B29-F687-4f45-9708-019B960494DF}">
+            <a:ext uri="{91240B29-F687-4F45-9708-019B960494DF}">
               <a14:hiddenLine xmlns:a14="http://schemas.microsoft.com/office/drawing/2010/main" w="9525">
                 <a:solidFill>
                   <a:schemeClr val="tx1"/>
@@ -7142,7 +7414,7 @@
                 <a:tailEnd/>
               </a14:hiddenLine>
             </a:ext>
-            <a:ext uri="{AF507438-7753-43e0-B8FC-AC1667EBCBE1}">
+            <a:ext uri="{AF507438-7753-43E0-B8FC-AC1667EBCBE1}">
               <a14:hiddenEffects xmlns:a14="http://schemas.microsoft.com/office/drawing/2010/main">
                 <a:effectLst>
                   <a:outerShdw dist="35921" dir="2700000" algn="ctr" rotWithShape="0">
@@ -7198,7 +7470,7 @@
   <p:timing>
     <p:tnLst>
       <p:par>
-        <p:cTn xmlns:p14="http://schemas.microsoft.com/office/powerpoint/2010/main" id="1" dur="indefinite" restart="never" nodeType="tmRoot"/>
+        <p:cTn id="1" dur="indefinite" restart="never" nodeType="tmRoot"/>
       </p:par>
     </p:tnLst>
   </p:timing>
@@ -7348,7 +7620,7 @@
   <p:timing>
     <p:tnLst>
       <p:par>
-        <p:cTn xmlns:p14="http://schemas.microsoft.com/office/powerpoint/2010/main" id="1" dur="indefinite" restart="never" nodeType="tmRoot"/>
+        <p:cTn id="1" dur="indefinite" restart="never" nodeType="tmRoot"/>
       </p:par>
     </p:tnLst>
   </p:timing>
@@ -7655,7 +7927,7 @@
   <p:timing>
     <p:tnLst>
       <p:par>
-        <p:cTn xmlns:p14="http://schemas.microsoft.com/office/powerpoint/2010/main" id="1" dur="indefinite" restart="never" nodeType="tmRoot"/>
+        <p:cTn id="1" dur="indefinite" restart="never" nodeType="tmRoot"/>
       </p:par>
     </p:tnLst>
   </p:timing>
@@ -7924,7 +8196,7 @@
   <p:timing>
     <p:tnLst>
       <p:par>
-        <p:cTn xmlns:p14="http://schemas.microsoft.com/office/powerpoint/2010/main" id="1" dur="indefinite" restart="never" nodeType="tmRoot"/>
+        <p:cTn id="1" dur="indefinite" restart="never" nodeType="tmRoot"/>
       </p:par>
     </p:tnLst>
   </p:timing>

</xml_diff>